<commit_message>
latest updates to website
</commit_message>
<xml_diff>
--- a/MACHINE LEARNING.pptx
+++ b/MACHINE LEARNING.pptx
@@ -7,12 +7,11 @@
   <p:sldIdLst>
     <p:sldId id="256" r:id="rId2"/>
     <p:sldId id="257" r:id="rId3"/>
-    <p:sldId id="260" r:id="rId4"/>
-    <p:sldId id="261" r:id="rId5"/>
-    <p:sldId id="258" r:id="rId6"/>
-    <p:sldId id="259" r:id="rId7"/>
-    <p:sldId id="263" r:id="rId8"/>
-    <p:sldId id="262" r:id="rId9"/>
+    <p:sldId id="264" r:id="rId4"/>
+    <p:sldId id="258" r:id="rId5"/>
+    <p:sldId id="259" r:id="rId6"/>
+    <p:sldId id="265" r:id="rId7"/>
+    <p:sldId id="262" r:id="rId8"/>
   </p:sldIdLst>
   <p:sldSz cx="12192000" cy="6858000"/>
   <p:notesSz cx="6858000" cy="9144000"/>
@@ -268,7 +267,7 @@
           <a:p>
             <a:fld id="{C43A76A3-ADC8-4477-8FC1-B9DD55D84908}" type="datetime1">
               <a:rPr lang="en-US" smtClean="0"/>
-              <a:t>5/3/2022</a:t>
+              <a:t>6/28/2022</a:t>
             </a:fld>
             <a:endParaRPr lang="en-US" dirty="0"/>
           </a:p>
@@ -466,7 +465,7 @@
           <a:p>
             <a:fld id="{D6762538-DC4D-4667-96E5-B3278DDF8B12}" type="datetime1">
               <a:rPr lang="en-US" smtClean="0"/>
-              <a:t>5/3/2022</a:t>
+              <a:t>6/28/2022</a:t>
             </a:fld>
             <a:endParaRPr lang="en-US"/>
           </a:p>
@@ -674,7 +673,7 @@
           <a:p>
             <a:fld id="{05880548-5C08-4BE3-B63E-F2BB63B0B00C}" type="datetime1">
               <a:rPr lang="en-US" smtClean="0"/>
-              <a:t>5/3/2022</a:t>
+              <a:t>6/28/2022</a:t>
             </a:fld>
             <a:endParaRPr lang="en-US"/>
           </a:p>
@@ -872,7 +871,7 @@
           <a:p>
             <a:fld id="{DE7F49BE-398D-479A-8A7E-5DDBCA61EDCB}" type="datetime1">
               <a:rPr lang="en-US" smtClean="0"/>
-              <a:t>5/3/2022</a:t>
+              <a:t>6/28/2022</a:t>
             </a:fld>
             <a:endParaRPr lang="en-US"/>
           </a:p>
@@ -1148,7 +1147,7 @@
           <a:p>
             <a:fld id="{CCD0C193-4974-4A1F-9C63-07D595E30D66}" type="datetime1">
               <a:rPr lang="en-US" smtClean="0"/>
-              <a:t>5/3/2022</a:t>
+              <a:t>6/28/2022</a:t>
             </a:fld>
             <a:endParaRPr lang="en-US"/>
           </a:p>
@@ -1415,7 +1414,7 @@
           <a:p>
             <a:fld id="{701AA87F-28D4-4BF0-B81F-877A89DFD5AC}" type="datetime1">
               <a:rPr lang="en-US" smtClean="0"/>
-              <a:t>5/3/2022</a:t>
+              <a:t>6/28/2022</a:t>
             </a:fld>
             <a:endParaRPr lang="en-US"/>
           </a:p>
@@ -1829,7 +1828,7 @@
           <a:p>
             <a:fld id="{A8A9F1F3-208B-49A3-B337-9C8ACEB3E0E1}" type="datetime1">
               <a:rPr lang="en-US" smtClean="0"/>
-              <a:t>5/3/2022</a:t>
+              <a:t>6/28/2022</a:t>
             </a:fld>
             <a:endParaRPr lang="en-US"/>
           </a:p>
@@ -1976,7 +1975,7 @@
           <a:p>
             <a:fld id="{27AF6CA6-7293-4AA2-A0E0-A3BF4416E786}" type="datetime1">
               <a:rPr lang="en-US" smtClean="0"/>
-              <a:t>5/3/2022</a:t>
+              <a:t>6/28/2022</a:t>
             </a:fld>
             <a:endParaRPr lang="en-US"/>
           </a:p>
@@ -2089,7 +2088,7 @@
           <a:p>
             <a:fld id="{98D87016-7BCD-46FB-8EE3-AB6C369108B4}" type="datetime1">
               <a:rPr lang="en-US" smtClean="0"/>
-              <a:t>5/3/2022</a:t>
+              <a:t>6/28/2022</a:t>
             </a:fld>
             <a:endParaRPr lang="en-US"/>
           </a:p>
@@ -2408,7 +2407,7 @@
           <a:p>
             <a:fld id="{A1547011-1FFC-4EF8-9A2E-53B4AD2ADBD4}" type="datetime1">
               <a:rPr lang="en-US" smtClean="0"/>
-              <a:t>5/3/2022</a:t>
+              <a:t>6/28/2022</a:t>
             </a:fld>
             <a:endParaRPr lang="en-US"/>
           </a:p>
@@ -2703,7 +2702,7 @@
           <a:p>
             <a:fld id="{9562EB47-45B4-4EF5-A743-B4885DD2F060}" type="datetime1">
               <a:rPr lang="en-US" smtClean="0"/>
-              <a:t>5/3/2022</a:t>
+              <a:t>6/28/2022</a:t>
             </a:fld>
             <a:endParaRPr lang="en-US"/>
           </a:p>
@@ -4088,7 +4087,7 @@
           <a:p>
             <a:fld id="{4A8D24A4-5FEC-4062-8995-EB21925B3B40}" type="datetime1">
               <a:rPr lang="en-US" smtClean="0"/>
-              <a:t>5/3/2022</a:t>
+              <a:t>6/28/2022</a:t>
             </a:fld>
             <a:endParaRPr lang="en-US" sz="1000" dirty="0"/>
           </a:p>
@@ -4627,6 +4626,1311 @@
 </file>
 
 <file path=ppt/slides/slide1.xml><?xml version="1.0" encoding="utf-8"?>
+<p:sld xmlns:a="http://schemas.openxmlformats.org/drawingml/2006/main" xmlns:r="http://schemas.openxmlformats.org/officeDocument/2006/relationships" xmlns:p="http://schemas.openxmlformats.org/presentationml/2006/main">
+  <p:cSld>
+    <p:bg>
+      <p:bgPr>
+        <a:solidFill>
+          <a:schemeClr val="bg1"/>
+        </a:solidFill>
+        <a:effectLst/>
+      </p:bgPr>
+    </p:bg>
+    <p:spTree>
+      <p:nvGrpSpPr>
+        <p:cNvPr id="1" name=""/>
+        <p:cNvGrpSpPr/>
+        <p:nvPr/>
+      </p:nvGrpSpPr>
+      <p:grpSpPr>
+        <a:xfrm>
+          <a:off x="0" y="0"/>
+          <a:ext cx="0" cy="0"/>
+          <a:chOff x="0" y="0"/>
+          <a:chExt cx="0" cy="0"/>
+        </a:xfrm>
+      </p:grpSpPr>
+      <p:sp useBgFill="1">
+        <p:nvSpPr>
+          <p:cNvPr id="26" name="Rectangle 25">
+            <a:extLst>
+              <a:ext uri="{FF2B5EF4-FFF2-40B4-BE49-F238E27FC236}">
+                <a16:creationId xmlns:a16="http://schemas.microsoft.com/office/drawing/2014/main" id="{733E0473-C315-42D8-A82A-A2FE49DC67DA}"/>
+              </a:ext>
+              <a:ext uri="{C183D7F6-B498-43B3-948B-1728B52AA6E4}">
+                <adec:decorative xmlns:adec="http://schemas.microsoft.com/office/drawing/2017/decorative" val="1"/>
+              </a:ext>
+            </a:extLst>
+          </p:cNvPr>
+          <p:cNvSpPr>
+            <a:spLocks noGrp="1" noRot="1" noChangeAspect="1" noMove="1" noResize="1" noEditPoints="1" noAdjustHandles="1" noChangeArrowheads="1" noChangeShapeType="1" noTextEdit="1"/>
+          </p:cNvSpPr>
+          <p:nvPr>
+            <p:extLst>
+              <p:ext uri="{386F3935-93C4-4BCD-93E2-E3B085C9AB24}">
+                <p16:designElem xmlns:p16="http://schemas.microsoft.com/office/powerpoint/2015/main" val="1"/>
+              </p:ext>
+            </p:extLst>
+          </p:nvPr>
+        </p:nvSpPr>
+        <p:spPr>
+          <a:xfrm>
+            <a:off x="-1" y="0"/>
+            <a:ext cx="12188952" cy="6858000"/>
+          </a:xfrm>
+          <a:prstGeom prst="rect">
+            <a:avLst/>
+          </a:prstGeom>
+          <a:ln>
+            <a:noFill/>
+          </a:ln>
+        </p:spPr>
+        <p:style>
+          <a:lnRef idx="2">
+            <a:schemeClr val="accent1">
+              <a:shade val="50000"/>
+            </a:schemeClr>
+          </a:lnRef>
+          <a:fillRef idx="1">
+            <a:schemeClr val="accent1"/>
+          </a:fillRef>
+          <a:effectRef idx="0">
+            <a:schemeClr val="accent1"/>
+          </a:effectRef>
+          <a:fontRef idx="minor">
+            <a:schemeClr val="lt1"/>
+          </a:fontRef>
+        </p:style>
+        <p:txBody>
+          <a:bodyPr rtlCol="0" anchor="ctr"/>
+          <a:lstStyle/>
+          <a:p>
+            <a:pPr algn="ctr"/>
+            <a:endParaRPr lang="en-US"/>
+          </a:p>
+        </p:txBody>
+      </p:sp>
+      <p:sp>
+        <p:nvSpPr>
+          <p:cNvPr id="28" name="Rectangle 27">
+            <a:extLst>
+              <a:ext uri="{FF2B5EF4-FFF2-40B4-BE49-F238E27FC236}">
+                <a16:creationId xmlns:a16="http://schemas.microsoft.com/office/drawing/2014/main" id="{AD23A251-68F2-43E5-812B-4BBAE1AF535E}"/>
+              </a:ext>
+              <a:ext uri="{C183D7F6-B498-43B3-948B-1728B52AA6E4}">
+                <adec:decorative xmlns:adec="http://schemas.microsoft.com/office/drawing/2017/decorative" val="1"/>
+              </a:ext>
+            </a:extLst>
+          </p:cNvPr>
+          <p:cNvSpPr>
+            <a:spLocks noGrp="1" noRot="1" noChangeAspect="1" noMove="1" noResize="1" noEditPoints="1" noAdjustHandles="1" noChangeArrowheads="1" noChangeShapeType="1" noTextEdit="1"/>
+          </p:cNvSpPr>
+          <p:nvPr>
+            <p:extLst>
+              <p:ext uri="{386F3935-93C4-4BCD-93E2-E3B085C9AB24}">
+                <p16:designElem xmlns:p16="http://schemas.microsoft.com/office/powerpoint/2015/main" val="1"/>
+              </p:ext>
+            </p:extLst>
+          </p:nvPr>
+        </p:nvSpPr>
+        <p:spPr>
+          <a:xfrm>
+            <a:off x="1524" y="0"/>
+            <a:ext cx="12188952" cy="6858000"/>
+          </a:xfrm>
+          <a:prstGeom prst="rect">
+            <a:avLst/>
+          </a:prstGeom>
+          <a:solidFill>
+            <a:srgbClr val="000000"/>
+          </a:solidFill>
+          <a:ln>
+            <a:noFill/>
+          </a:ln>
+        </p:spPr>
+        <p:style>
+          <a:lnRef idx="2">
+            <a:schemeClr val="accent1">
+              <a:shade val="50000"/>
+            </a:schemeClr>
+          </a:lnRef>
+          <a:fillRef idx="1">
+            <a:schemeClr val="accent1"/>
+          </a:fillRef>
+          <a:effectRef idx="0">
+            <a:schemeClr val="accent1"/>
+          </a:effectRef>
+          <a:fontRef idx="minor">
+            <a:schemeClr val="lt1"/>
+          </a:fontRef>
+        </p:style>
+        <p:txBody>
+          <a:bodyPr rtlCol="0" anchor="ctr"/>
+          <a:lstStyle/>
+          <a:p>
+            <a:pPr algn="ctr"/>
+            <a:endParaRPr lang="en-US" sz="900">
+              <a:solidFill>
+                <a:schemeClr val="bg1"/>
+              </a:solidFill>
+              <a:latin typeface="+mj-lt"/>
+            </a:endParaRPr>
+          </a:p>
+        </p:txBody>
+      </p:sp>
+      <p:pic>
+        <p:nvPicPr>
+          <p:cNvPr id="4" name="Picture 3" descr="Aerial view of sandy beach and ocean with waves">
+            <a:extLst>
+              <a:ext uri="{FF2B5EF4-FFF2-40B4-BE49-F238E27FC236}">
+                <a16:creationId xmlns:a16="http://schemas.microsoft.com/office/drawing/2014/main" id="{A824D5C8-C167-BDC7-C229-EDBFB8E9BDC8}"/>
+              </a:ext>
+            </a:extLst>
+          </p:cNvPr>
+          <p:cNvPicPr>
+            <a:picLocks noChangeAspect="1"/>
+          </p:cNvPicPr>
+          <p:nvPr/>
+        </p:nvPicPr>
+        <p:blipFill rotWithShape="1">
+          <a:blip r:embed="rId2">
+            <a:alphaModFix amt="40000"/>
+          </a:blip>
+          <a:srcRect r="-1" b="24980"/>
+          <a:stretch/>
+        </p:blipFill>
+        <p:spPr>
+          <a:xfrm>
+            <a:off x="1525" y="10"/>
+            <a:ext cx="12188951" cy="6857990"/>
+          </a:xfrm>
+          <a:prstGeom prst="rect">
+            <a:avLst/>
+          </a:prstGeom>
+        </p:spPr>
+      </p:pic>
+      <p:grpSp>
+        <p:nvGrpSpPr>
+          <p:cNvPr id="30" name="decorative circle">
+            <a:extLst>
+              <a:ext uri="{FF2B5EF4-FFF2-40B4-BE49-F238E27FC236}">
+                <a16:creationId xmlns:a16="http://schemas.microsoft.com/office/drawing/2014/main" id="{0350AF23-2606-421F-AB7B-23D9B48F3E9B}"/>
+              </a:ext>
+              <a:ext uri="{C183D7F6-B498-43B3-948B-1728B52AA6E4}">
+                <adec:decorative xmlns:adec="http://schemas.microsoft.com/office/drawing/2017/decorative" val="1"/>
+              </a:ext>
+            </a:extLst>
+          </p:cNvPr>
+          <p:cNvGrpSpPr>
+            <a:grpSpLocks noGrp="1" noUngrp="1" noRot="1" noChangeAspect="1" noMove="1" noResize="1"/>
+          </p:cNvGrpSpPr>
+          <p:nvPr>
+            <p:extLst>
+              <p:ext uri="{386F3935-93C4-4BCD-93E2-E3B085C9AB24}">
+                <p16:designElem xmlns:p16="http://schemas.microsoft.com/office/powerpoint/2015/main" val="1"/>
+              </p:ext>
+            </p:extLst>
+          </p:nvPr>
+        </p:nvGrpSpPr>
+        <p:grpSpPr>
+          <a:xfrm>
+            <a:off x="314102" y="236341"/>
+            <a:ext cx="11340713" cy="5464029"/>
+            <a:chOff x="314102" y="236341"/>
+            <a:chExt cx="11340713" cy="5464029"/>
+          </a:xfrm>
+        </p:grpSpPr>
+        <p:sp>
+          <p:nvSpPr>
+            <p:cNvPr id="31" name="Oval 30">
+              <a:extLst>
+                <a:ext uri="{FF2B5EF4-FFF2-40B4-BE49-F238E27FC236}">
+                  <a16:creationId xmlns:a16="http://schemas.microsoft.com/office/drawing/2014/main" id="{526A544A-3C76-4502-A741-F4DB0E2CD2FD}"/>
+                </a:ext>
+                <a:ext uri="{C183D7F6-B498-43B3-948B-1728B52AA6E4}">
+                  <adec:decorative xmlns:adec="http://schemas.microsoft.com/office/drawing/2017/decorative" val="1"/>
+                </a:ext>
+              </a:extLst>
+            </p:cNvPr>
+            <p:cNvSpPr/>
+            <p:nvPr>
+              <p:extLst>
+                <p:ext uri="{386F3935-93C4-4BCD-93E2-E3B085C9AB24}">
+                  <p16:designElem xmlns:p16="http://schemas.microsoft.com/office/powerpoint/2015/main" val="1"/>
+                </p:ext>
+              </p:extLst>
+            </p:nvPr>
+          </p:nvSpPr>
+          <p:spPr>
+            <a:xfrm>
+              <a:off x="7760448" y="3803994"/>
+              <a:ext cx="94160" cy="94160"/>
+            </a:xfrm>
+            <a:prstGeom prst="ellipse">
+              <a:avLst/>
+            </a:prstGeom>
+            <a:solidFill>
+              <a:srgbClr val="E3BEBE">
+                <a:alpha val="28000"/>
+              </a:srgbClr>
+            </a:solidFill>
+            <a:ln>
+              <a:noFill/>
+            </a:ln>
+          </p:spPr>
+          <p:style>
+            <a:lnRef idx="2">
+              <a:schemeClr val="accent1">
+                <a:shade val="50000"/>
+              </a:schemeClr>
+            </a:lnRef>
+            <a:fillRef idx="1">
+              <a:schemeClr val="accent1"/>
+            </a:fillRef>
+            <a:effectRef idx="0">
+              <a:schemeClr val="accent1"/>
+            </a:effectRef>
+            <a:fontRef idx="minor">
+              <a:schemeClr val="lt1"/>
+            </a:fontRef>
+          </p:style>
+          <p:txBody>
+            <a:bodyPr rtlCol="0" anchor="ctr"/>
+            <a:lstStyle/>
+            <a:p>
+              <a:pPr algn="ctr"/>
+              <a:endParaRPr lang="en-US"/>
+            </a:p>
+          </p:txBody>
+        </p:sp>
+        <p:sp>
+          <p:nvSpPr>
+            <p:cNvPr id="32" name="Oval 31">
+              <a:extLst>
+                <a:ext uri="{FF2B5EF4-FFF2-40B4-BE49-F238E27FC236}">
+                  <a16:creationId xmlns:a16="http://schemas.microsoft.com/office/drawing/2014/main" id="{017B8593-D171-47B5-8D1A-E34E7B138476}"/>
+                </a:ext>
+                <a:ext uri="{C183D7F6-B498-43B3-948B-1728B52AA6E4}">
+                  <adec:decorative xmlns:adec="http://schemas.microsoft.com/office/drawing/2017/decorative" val="1"/>
+                </a:ext>
+              </a:extLst>
+            </p:cNvPr>
+            <p:cNvSpPr/>
+            <p:nvPr>
+              <p:extLst>
+                <p:ext uri="{386F3935-93C4-4BCD-93E2-E3B085C9AB24}">
+                  <p16:designElem xmlns:p16="http://schemas.microsoft.com/office/powerpoint/2015/main" val="1"/>
+                </p:ext>
+              </p:extLst>
+            </p:nvPr>
+          </p:nvSpPr>
+          <p:spPr>
+            <a:xfrm>
+              <a:off x="314102" y="3044381"/>
+              <a:ext cx="226735" cy="226735"/>
+            </a:xfrm>
+            <a:prstGeom prst="ellipse">
+              <a:avLst/>
+            </a:prstGeom>
+            <a:solidFill>
+              <a:schemeClr val="tx2">
+                <a:lumMod val="50000"/>
+                <a:lumOff val="50000"/>
+              </a:schemeClr>
+            </a:solidFill>
+            <a:ln>
+              <a:noFill/>
+            </a:ln>
+          </p:spPr>
+          <p:style>
+            <a:lnRef idx="2">
+              <a:schemeClr val="accent1">
+                <a:shade val="50000"/>
+              </a:schemeClr>
+            </a:lnRef>
+            <a:fillRef idx="1">
+              <a:schemeClr val="accent1"/>
+            </a:fillRef>
+            <a:effectRef idx="0">
+              <a:schemeClr val="accent1"/>
+            </a:effectRef>
+            <a:fontRef idx="minor">
+              <a:schemeClr val="lt1"/>
+            </a:fontRef>
+          </p:style>
+          <p:txBody>
+            <a:bodyPr rtlCol="0" anchor="ctr"/>
+            <a:lstStyle/>
+            <a:p>
+              <a:pPr algn="ctr"/>
+              <a:endParaRPr lang="en-US"/>
+            </a:p>
+          </p:txBody>
+        </p:sp>
+        <p:sp>
+          <p:nvSpPr>
+            <p:cNvPr id="33" name="Oval 32">
+              <a:extLst>
+                <a:ext uri="{FF2B5EF4-FFF2-40B4-BE49-F238E27FC236}">
+                  <a16:creationId xmlns:a16="http://schemas.microsoft.com/office/drawing/2014/main" id="{1FEF60D4-64F6-450F-B86D-383EEA1C843F}"/>
+                </a:ext>
+                <a:ext uri="{C183D7F6-B498-43B3-948B-1728B52AA6E4}">
+                  <adec:decorative xmlns:adec="http://schemas.microsoft.com/office/drawing/2017/decorative" val="1"/>
+                </a:ext>
+              </a:extLst>
+            </p:cNvPr>
+            <p:cNvSpPr/>
+            <p:nvPr>
+              <p:extLst>
+                <p:ext uri="{386F3935-93C4-4BCD-93E2-E3B085C9AB24}">
+                  <p16:designElem xmlns:p16="http://schemas.microsoft.com/office/powerpoint/2015/main" val="1"/>
+                </p:ext>
+              </p:extLst>
+            </p:nvPr>
+          </p:nvSpPr>
+          <p:spPr>
+            <a:xfrm>
+              <a:off x="11188374" y="386135"/>
+              <a:ext cx="466441" cy="466441"/>
+            </a:xfrm>
+            <a:prstGeom prst="ellipse">
+              <a:avLst/>
+            </a:prstGeom>
+            <a:solidFill>
+              <a:schemeClr val="accent2">
+                <a:lumMod val="60000"/>
+                <a:lumOff val="40000"/>
+                <a:alpha val="72000"/>
+              </a:schemeClr>
+            </a:solidFill>
+            <a:ln>
+              <a:noFill/>
+            </a:ln>
+          </p:spPr>
+          <p:style>
+            <a:lnRef idx="2">
+              <a:schemeClr val="accent1">
+                <a:shade val="50000"/>
+              </a:schemeClr>
+            </a:lnRef>
+            <a:fillRef idx="1">
+              <a:schemeClr val="accent1"/>
+            </a:fillRef>
+            <a:effectRef idx="0">
+              <a:schemeClr val="accent1"/>
+            </a:effectRef>
+            <a:fontRef idx="minor">
+              <a:schemeClr val="lt1"/>
+            </a:fontRef>
+          </p:style>
+          <p:txBody>
+            <a:bodyPr rtlCol="0" anchor="ctr"/>
+            <a:lstStyle/>
+            <a:p>
+              <a:pPr algn="ctr"/>
+              <a:endParaRPr lang="en-US"/>
+            </a:p>
+          </p:txBody>
+        </p:sp>
+        <p:sp>
+          <p:nvSpPr>
+            <p:cNvPr id="34" name="Oval 33">
+              <a:extLst>
+                <a:ext uri="{FF2B5EF4-FFF2-40B4-BE49-F238E27FC236}">
+                  <a16:creationId xmlns:a16="http://schemas.microsoft.com/office/drawing/2014/main" id="{A97D4A7C-B520-46CB-9A94-711F53997BDB}"/>
+                </a:ext>
+                <a:ext uri="{C183D7F6-B498-43B3-948B-1728B52AA6E4}">
+                  <adec:decorative xmlns:adec="http://schemas.microsoft.com/office/drawing/2017/decorative" val="1"/>
+                </a:ext>
+              </a:extLst>
+            </p:cNvPr>
+            <p:cNvSpPr/>
+            <p:nvPr>
+              <p:extLst>
+                <p:ext uri="{386F3935-93C4-4BCD-93E2-E3B085C9AB24}">
+                  <p16:designElem xmlns:p16="http://schemas.microsoft.com/office/powerpoint/2015/main" val="1"/>
+                </p:ext>
+              </p:extLst>
+            </p:nvPr>
+          </p:nvSpPr>
+          <p:spPr>
+            <a:xfrm>
+              <a:off x="11065714" y="236341"/>
+              <a:ext cx="113367" cy="113367"/>
+            </a:xfrm>
+            <a:prstGeom prst="ellipse">
+              <a:avLst/>
+            </a:prstGeom>
+            <a:solidFill>
+              <a:srgbClr val="F39E29"/>
+            </a:solidFill>
+            <a:ln>
+              <a:noFill/>
+            </a:ln>
+          </p:spPr>
+          <p:style>
+            <a:lnRef idx="2">
+              <a:schemeClr val="accent1">
+                <a:shade val="50000"/>
+              </a:schemeClr>
+            </a:lnRef>
+            <a:fillRef idx="1">
+              <a:schemeClr val="accent1"/>
+            </a:fillRef>
+            <a:effectRef idx="0">
+              <a:schemeClr val="accent1"/>
+            </a:effectRef>
+            <a:fontRef idx="minor">
+              <a:schemeClr val="lt1"/>
+            </a:fontRef>
+          </p:style>
+          <p:txBody>
+            <a:bodyPr rtlCol="0" anchor="ctr"/>
+            <a:lstStyle/>
+            <a:p>
+              <a:pPr algn="ctr"/>
+              <a:endParaRPr lang="en-US"/>
+            </a:p>
+          </p:txBody>
+        </p:sp>
+        <p:sp>
+          <p:nvSpPr>
+            <p:cNvPr id="35" name="Oval 34">
+              <a:extLst>
+                <a:ext uri="{FF2B5EF4-FFF2-40B4-BE49-F238E27FC236}">
+                  <a16:creationId xmlns:a16="http://schemas.microsoft.com/office/drawing/2014/main" id="{2B7B976F-E84B-4936-90D7-C8298A5E7BD0}"/>
+                </a:ext>
+                <a:ext uri="{C183D7F6-B498-43B3-948B-1728B52AA6E4}">
+                  <adec:decorative xmlns:adec="http://schemas.microsoft.com/office/drawing/2017/decorative" val="1"/>
+                </a:ext>
+              </a:extLst>
+            </p:cNvPr>
+            <p:cNvSpPr/>
+            <p:nvPr>
+              <p:extLst>
+                <p:ext uri="{386F3935-93C4-4BCD-93E2-E3B085C9AB24}">
+                  <p16:designElem xmlns:p16="http://schemas.microsoft.com/office/powerpoint/2015/main" val="1"/>
+                </p:ext>
+              </p:extLst>
+            </p:nvPr>
+          </p:nvSpPr>
+          <p:spPr>
+            <a:xfrm>
+              <a:off x="751535" y="2516671"/>
+              <a:ext cx="466441" cy="466441"/>
+            </a:xfrm>
+            <a:prstGeom prst="ellipse">
+              <a:avLst/>
+            </a:prstGeom>
+            <a:solidFill>
+              <a:schemeClr val="accent1"/>
+            </a:solidFill>
+            <a:ln>
+              <a:noFill/>
+            </a:ln>
+          </p:spPr>
+          <p:style>
+            <a:lnRef idx="2">
+              <a:schemeClr val="accent1">
+                <a:shade val="50000"/>
+              </a:schemeClr>
+            </a:lnRef>
+            <a:fillRef idx="1">
+              <a:schemeClr val="accent1"/>
+            </a:fillRef>
+            <a:effectRef idx="0">
+              <a:schemeClr val="accent1"/>
+            </a:effectRef>
+            <a:fontRef idx="minor">
+              <a:schemeClr val="lt1"/>
+            </a:fontRef>
+          </p:style>
+          <p:txBody>
+            <a:bodyPr rtlCol="0" anchor="ctr"/>
+            <a:lstStyle/>
+            <a:p>
+              <a:pPr algn="ctr"/>
+              <a:endParaRPr lang="en-US"/>
+            </a:p>
+          </p:txBody>
+        </p:sp>
+        <p:sp>
+          <p:nvSpPr>
+            <p:cNvPr id="36" name="Oval 35">
+              <a:extLst>
+                <a:ext uri="{FF2B5EF4-FFF2-40B4-BE49-F238E27FC236}">
+                  <a16:creationId xmlns:a16="http://schemas.microsoft.com/office/drawing/2014/main" id="{DC91FFEC-59DF-4D22-A925-F5152076924B}"/>
+                </a:ext>
+                <a:ext uri="{C183D7F6-B498-43B3-948B-1728B52AA6E4}">
+                  <adec:decorative xmlns:adec="http://schemas.microsoft.com/office/drawing/2017/decorative" val="1"/>
+                </a:ext>
+              </a:extLst>
+            </p:cNvPr>
+            <p:cNvSpPr/>
+            <p:nvPr>
+              <p:extLst>
+                <p:ext uri="{386F3935-93C4-4BCD-93E2-E3B085C9AB24}">
+                  <p16:designElem xmlns:p16="http://schemas.microsoft.com/office/powerpoint/2015/main" val="1"/>
+                </p:ext>
+              </p:extLst>
+            </p:nvPr>
+          </p:nvSpPr>
+          <p:spPr>
+            <a:xfrm>
+              <a:off x="11230142" y="4588038"/>
+              <a:ext cx="113367" cy="113367"/>
+            </a:xfrm>
+            <a:prstGeom prst="ellipse">
+              <a:avLst/>
+            </a:prstGeom>
+            <a:solidFill>
+              <a:schemeClr val="accent3"/>
+            </a:solidFill>
+            <a:ln>
+              <a:noFill/>
+            </a:ln>
+          </p:spPr>
+          <p:style>
+            <a:lnRef idx="2">
+              <a:schemeClr val="accent1">
+                <a:shade val="50000"/>
+              </a:schemeClr>
+            </a:lnRef>
+            <a:fillRef idx="1">
+              <a:schemeClr val="accent1"/>
+            </a:fillRef>
+            <a:effectRef idx="0">
+              <a:schemeClr val="accent1"/>
+            </a:effectRef>
+            <a:fontRef idx="minor">
+              <a:schemeClr val="lt1"/>
+            </a:fontRef>
+          </p:style>
+          <p:txBody>
+            <a:bodyPr rtlCol="0" anchor="ctr"/>
+            <a:lstStyle/>
+            <a:p>
+              <a:pPr algn="ctr"/>
+              <a:endParaRPr lang="en-US"/>
+            </a:p>
+          </p:txBody>
+        </p:sp>
+        <p:sp>
+          <p:nvSpPr>
+            <p:cNvPr id="37" name="Oval 36">
+              <a:extLst>
+                <a:ext uri="{FF2B5EF4-FFF2-40B4-BE49-F238E27FC236}">
+                  <a16:creationId xmlns:a16="http://schemas.microsoft.com/office/drawing/2014/main" id="{58931E95-0847-47E4-8AEC-312312A03232}"/>
+                </a:ext>
+                <a:ext uri="{C183D7F6-B498-43B3-948B-1728B52AA6E4}">
+                  <adec:decorative xmlns:adec="http://schemas.microsoft.com/office/drawing/2017/decorative" val="1"/>
+                </a:ext>
+              </a:extLst>
+            </p:cNvPr>
+            <p:cNvSpPr/>
+            <p:nvPr>
+              <p:extLst>
+                <p:ext uri="{386F3935-93C4-4BCD-93E2-E3B085C9AB24}">
+                  <p16:designElem xmlns:p16="http://schemas.microsoft.com/office/powerpoint/2015/main" val="1"/>
+                </p:ext>
+              </p:extLst>
+            </p:nvPr>
+          </p:nvSpPr>
+          <p:spPr>
+            <a:xfrm>
+              <a:off x="10902046" y="5394590"/>
+              <a:ext cx="305780" cy="305780"/>
+            </a:xfrm>
+            <a:prstGeom prst="ellipse">
+              <a:avLst/>
+            </a:prstGeom>
+            <a:solidFill>
+              <a:schemeClr val="accent1">
+                <a:lumMod val="40000"/>
+                <a:lumOff val="60000"/>
+              </a:schemeClr>
+            </a:solidFill>
+            <a:ln>
+              <a:noFill/>
+            </a:ln>
+          </p:spPr>
+          <p:style>
+            <a:lnRef idx="2">
+              <a:schemeClr val="accent1">
+                <a:shade val="50000"/>
+              </a:schemeClr>
+            </a:lnRef>
+            <a:fillRef idx="1">
+              <a:schemeClr val="accent1"/>
+            </a:fillRef>
+            <a:effectRef idx="0">
+              <a:schemeClr val="accent1"/>
+            </a:effectRef>
+            <a:fontRef idx="minor">
+              <a:schemeClr val="lt1"/>
+            </a:fontRef>
+          </p:style>
+          <p:txBody>
+            <a:bodyPr rtlCol="0" anchor="ctr"/>
+            <a:lstStyle/>
+            <a:p>
+              <a:pPr algn="ctr"/>
+              <a:endParaRPr lang="en-US"/>
+            </a:p>
+          </p:txBody>
+        </p:sp>
+        <p:sp>
+          <p:nvSpPr>
+            <p:cNvPr id="38" name="Oval 37">
+              <a:extLst>
+                <a:ext uri="{FF2B5EF4-FFF2-40B4-BE49-F238E27FC236}">
+                  <a16:creationId xmlns:a16="http://schemas.microsoft.com/office/drawing/2014/main" id="{3C094915-EF93-49A0-9B90-C44FB9B5007A}"/>
+                </a:ext>
+                <a:ext uri="{C183D7F6-B498-43B3-948B-1728B52AA6E4}">
+                  <adec:decorative xmlns:adec="http://schemas.microsoft.com/office/drawing/2017/decorative" val="1"/>
+                </a:ext>
+              </a:extLst>
+            </p:cNvPr>
+            <p:cNvSpPr/>
+            <p:nvPr>
+              <p:extLst>
+                <p:ext uri="{386F3935-93C4-4BCD-93E2-E3B085C9AB24}">
+                  <p16:designElem xmlns:p16="http://schemas.microsoft.com/office/powerpoint/2015/main" val="1"/>
+                </p:ext>
+              </p:extLst>
+            </p:nvPr>
+          </p:nvSpPr>
+          <p:spPr>
+            <a:xfrm>
+              <a:off x="10408287" y="5160714"/>
+              <a:ext cx="113367" cy="113367"/>
+            </a:xfrm>
+            <a:prstGeom prst="ellipse">
+              <a:avLst/>
+            </a:prstGeom>
+            <a:solidFill>
+              <a:schemeClr val="accent5"/>
+            </a:solidFill>
+            <a:ln>
+              <a:noFill/>
+            </a:ln>
+          </p:spPr>
+          <p:style>
+            <a:lnRef idx="2">
+              <a:schemeClr val="accent1">
+                <a:shade val="50000"/>
+              </a:schemeClr>
+            </a:lnRef>
+            <a:fillRef idx="1">
+              <a:schemeClr val="accent1"/>
+            </a:fillRef>
+            <a:effectRef idx="0">
+              <a:schemeClr val="accent1"/>
+            </a:effectRef>
+            <a:fontRef idx="minor">
+              <a:schemeClr val="lt1"/>
+            </a:fontRef>
+          </p:style>
+          <p:txBody>
+            <a:bodyPr rtlCol="0" anchor="ctr"/>
+            <a:lstStyle/>
+            <a:p>
+              <a:pPr algn="ctr"/>
+              <a:endParaRPr lang="en-US"/>
+            </a:p>
+          </p:txBody>
+        </p:sp>
+      </p:grpSp>
+      <p:sp>
+        <p:nvSpPr>
+          <p:cNvPr id="2" name="Title 1">
+            <a:extLst>
+              <a:ext uri="{FF2B5EF4-FFF2-40B4-BE49-F238E27FC236}">
+                <a16:creationId xmlns:a16="http://schemas.microsoft.com/office/drawing/2014/main" id="{A598DAE5-AFB7-C502-E6E4-36E1FAC0BE64}"/>
+              </a:ext>
+            </a:extLst>
+          </p:cNvPr>
+          <p:cNvSpPr>
+            <a:spLocks noGrp="1"/>
+          </p:cNvSpPr>
+          <p:nvPr>
+            <p:ph type="ctrTitle"/>
+          </p:nvPr>
+        </p:nvSpPr>
+        <p:spPr>
+          <a:xfrm>
+            <a:off x="2562606" y="1122363"/>
+            <a:ext cx="7063739" cy="2387600"/>
+          </a:xfrm>
+        </p:spPr>
+        <p:txBody>
+          <a:bodyPr>
+            <a:normAutofit/>
+          </a:bodyPr>
+          <a:lstStyle/>
+          <a:p>
+            <a:r>
+              <a:rPr lang="en-AU" dirty="0">
+                <a:solidFill>
+                  <a:srgbClr val="FFFFFF"/>
+                </a:solidFill>
+              </a:rPr>
+              <a:t>MACHINE LEARNING</a:t>
+            </a:r>
+            <a:br>
+              <a:rPr lang="en-AU" dirty="0">
+                <a:solidFill>
+                  <a:srgbClr val="FFFFFF"/>
+                </a:solidFill>
+              </a:rPr>
+            </a:br>
+            <a:r>
+              <a:rPr lang="en-AU" dirty="0">
+                <a:solidFill>
+                  <a:srgbClr val="FFFFFF"/>
+                </a:solidFill>
+              </a:rPr>
+              <a:t>WEBSITE</a:t>
+            </a:r>
+          </a:p>
+        </p:txBody>
+      </p:sp>
+      <p:sp>
+        <p:nvSpPr>
+          <p:cNvPr id="3" name="Subtitle 2">
+            <a:extLst>
+              <a:ext uri="{FF2B5EF4-FFF2-40B4-BE49-F238E27FC236}">
+                <a16:creationId xmlns:a16="http://schemas.microsoft.com/office/drawing/2014/main" id="{0ED3846D-A3E6-D02C-B627-A5CB2CA7753F}"/>
+              </a:ext>
+            </a:extLst>
+          </p:cNvPr>
+          <p:cNvSpPr>
+            <a:spLocks noGrp="1"/>
+          </p:cNvSpPr>
+          <p:nvPr>
+            <p:ph type="subTitle" idx="1"/>
+          </p:nvPr>
+        </p:nvSpPr>
+        <p:spPr>
+          <a:xfrm>
+            <a:off x="2562606" y="3602038"/>
+            <a:ext cx="7063739" cy="1655762"/>
+          </a:xfrm>
+        </p:spPr>
+        <p:txBody>
+          <a:bodyPr>
+            <a:normAutofit/>
+          </a:bodyPr>
+          <a:lstStyle/>
+          <a:p>
+            <a:r>
+              <a:rPr lang="en-AU" dirty="0">
+                <a:solidFill>
+                  <a:srgbClr val="FFFFFF"/>
+                </a:solidFill>
+              </a:rPr>
+              <a:t>Share Price Prediction</a:t>
+            </a:r>
+          </a:p>
+          <a:p>
+            <a:r>
+              <a:rPr lang="en-AU" dirty="0">
+                <a:solidFill>
+                  <a:srgbClr val="FFFFFF"/>
+                </a:solidFill>
+              </a:rPr>
+              <a:t>By Antoinette Boyle</a:t>
+            </a:r>
+          </a:p>
+        </p:txBody>
+      </p:sp>
+    </p:spTree>
+    <p:extLst>
+      <p:ext uri="{BB962C8B-B14F-4D97-AF65-F5344CB8AC3E}">
+        <p14:creationId xmlns:p14="http://schemas.microsoft.com/office/powerpoint/2010/main" val="2908876239"/>
+      </p:ext>
+    </p:extLst>
+  </p:cSld>
+  <p:clrMapOvr>
+    <a:masterClrMapping/>
+  </p:clrMapOvr>
+  <mc:AlternateContent xmlns:mc="http://schemas.openxmlformats.org/markup-compatibility/2006" xmlns:p14="http://schemas.microsoft.com/office/powerpoint/2010/main">
+    <mc:Choice Requires="p14">
+      <p:transition p14:dur="250"/>
+    </mc:Choice>
+    <mc:Fallback xmlns="">
+      <p:transition/>
+    </mc:Fallback>
+  </mc:AlternateContent>
+  <p:timing>
+    <p:tnLst>
+      <p:par>
+        <p:cTn id="1" dur="indefinite" restart="never" nodeType="tmRoot">
+          <p:childTnLst>
+            <p:seq concurrent="1" nextAc="seek">
+              <p:cTn id="2" dur="indefinite" nodeType="mainSeq">
+                <p:childTnLst>
+                  <p:par>
+                    <p:cTn id="3" fill="hold">
+                      <p:stCondLst>
+                        <p:cond delay="indefinite"/>
+                        <p:cond evt="onBegin" delay="0">
+                          <p:tn val="2"/>
+                        </p:cond>
+                      </p:stCondLst>
+                      <p:childTnLst>
+                        <p:par>
+                          <p:cTn id="4" fill="hold">
+                            <p:stCondLst>
+                              <p:cond delay="0"/>
+                            </p:stCondLst>
+                            <p:childTnLst>
+                              <p:par>
+                                <p:cTn id="5" presetID="10" presetClass="entr" presetSubtype="0" fill="hold" grpId="0" nodeType="withEffect">
+                                  <p:stCondLst>
+                                    <p:cond delay="1500"/>
+                                  </p:stCondLst>
+                                  <p:iterate>
+                                    <p:tmPct val="10000"/>
+                                  </p:iterate>
+                                  <p:childTnLst>
+                                    <p:set>
+                                      <p:cBhvr>
+                                        <p:cTn id="6" dur="1" fill="hold">
+                                          <p:stCondLst>
+                                            <p:cond delay="0"/>
+                                          </p:stCondLst>
+                                        </p:cTn>
+                                        <p:tgtEl>
+                                          <p:spTgt spid="3">
+                                            <p:txEl>
+                                              <p:pRg st="0" end="0"/>
+                                            </p:txEl>
+                                          </p:spTgt>
+                                        </p:tgtEl>
+                                        <p:attrNameLst>
+                                          <p:attrName>style.visibility</p:attrName>
+                                        </p:attrNameLst>
+                                      </p:cBhvr>
+                                      <p:to>
+                                        <p:strVal val="visible"/>
+                                      </p:to>
+                                    </p:set>
+                                    <p:animEffect transition="in" filter="fade">
+                                      <p:cBhvr>
+                                        <p:cTn id="7" dur="700"/>
+                                        <p:tgtEl>
+                                          <p:spTgt spid="3">
+                                            <p:txEl>
+                                              <p:pRg st="0" end="0"/>
+                                            </p:txEl>
+                                          </p:spTgt>
+                                        </p:tgtEl>
+                                      </p:cBhvr>
+                                    </p:animEffect>
+                                  </p:childTnLst>
+                                </p:cTn>
+                              </p:par>
+                              <p:par>
+                                <p:cTn id="8" presetID="10" presetClass="entr" presetSubtype="0" fill="hold" grpId="0" nodeType="withEffect">
+                                  <p:stCondLst>
+                                    <p:cond delay="1000"/>
+                                  </p:stCondLst>
+                                  <p:iterate>
+                                    <p:tmPct val="10000"/>
+                                  </p:iterate>
+                                  <p:childTnLst>
+                                    <p:set>
+                                      <p:cBhvr>
+                                        <p:cTn id="9" dur="1" fill="hold">
+                                          <p:stCondLst>
+                                            <p:cond delay="0"/>
+                                          </p:stCondLst>
+                                        </p:cTn>
+                                        <p:tgtEl>
+                                          <p:spTgt spid="2"/>
+                                        </p:tgtEl>
+                                        <p:attrNameLst>
+                                          <p:attrName>style.visibility</p:attrName>
+                                        </p:attrNameLst>
+                                      </p:cBhvr>
+                                      <p:to>
+                                        <p:strVal val="visible"/>
+                                      </p:to>
+                                    </p:set>
+                                    <p:animEffect transition="in" filter="fade">
+                                      <p:cBhvr>
+                                        <p:cTn id="10" dur="700"/>
+                                        <p:tgtEl>
+                                          <p:spTgt spid="2"/>
+                                        </p:tgtEl>
+                                      </p:cBhvr>
+                                    </p:animEffect>
+                                  </p:childTnLst>
+                                </p:cTn>
+                              </p:par>
+                            </p:childTnLst>
+                          </p:cTn>
+                        </p:par>
+                      </p:childTnLst>
+                    </p:cTn>
+                  </p:par>
+                  <p:par>
+                    <p:cTn id="11" fill="hold">
+                      <p:stCondLst>
+                        <p:cond delay="indefinite"/>
+                      </p:stCondLst>
+                      <p:childTnLst>
+                        <p:par>
+                          <p:cTn id="12" fill="hold">
+                            <p:stCondLst>
+                              <p:cond delay="0"/>
+                            </p:stCondLst>
+                            <p:childTnLst>
+                              <p:par>
+                                <p:cTn id="13" presetID="10" presetClass="entr" presetSubtype="0" fill="hold" grpId="0" nodeType="clickEffect">
+                                  <p:stCondLst>
+                                    <p:cond delay="1500"/>
+                                  </p:stCondLst>
+                                  <p:iterate>
+                                    <p:tmPct val="10000"/>
+                                  </p:iterate>
+                                  <p:childTnLst>
+                                    <p:set>
+                                      <p:cBhvr>
+                                        <p:cTn id="14" dur="1" fill="hold">
+                                          <p:stCondLst>
+                                            <p:cond delay="0"/>
+                                          </p:stCondLst>
+                                        </p:cTn>
+                                        <p:tgtEl>
+                                          <p:spTgt spid="3">
+                                            <p:txEl>
+                                              <p:pRg st="1" end="1"/>
+                                            </p:txEl>
+                                          </p:spTgt>
+                                        </p:tgtEl>
+                                        <p:attrNameLst>
+                                          <p:attrName>style.visibility</p:attrName>
+                                        </p:attrNameLst>
+                                      </p:cBhvr>
+                                      <p:to>
+                                        <p:strVal val="visible"/>
+                                      </p:to>
+                                    </p:set>
+                                    <p:animEffect transition="in" filter="fade">
+                                      <p:cBhvr>
+                                        <p:cTn id="15" dur="700"/>
+                                        <p:tgtEl>
+                                          <p:spTgt spid="3">
+                                            <p:txEl>
+                                              <p:pRg st="1" end="1"/>
+                                            </p:txEl>
+                                          </p:spTgt>
+                                        </p:tgtEl>
+                                      </p:cBhvr>
+                                    </p:animEffect>
+                                  </p:childTnLst>
+                                </p:cTn>
+                              </p:par>
+                            </p:childTnLst>
+                          </p:cTn>
+                        </p:par>
+                      </p:childTnLst>
+                    </p:cTn>
+                  </p:par>
+                </p:childTnLst>
+              </p:cTn>
+              <p:prevCondLst>
+                <p:cond evt="onPrev" delay="0">
+                  <p:tgtEl>
+                    <p:sldTgt/>
+                  </p:tgtEl>
+                </p:cond>
+              </p:prevCondLst>
+              <p:nextCondLst>
+                <p:cond evt="onNext" delay="0">
+                  <p:tgtEl>
+                    <p:sldTgt/>
+                  </p:tgtEl>
+                </p:cond>
+              </p:nextCondLst>
+            </p:seq>
+          </p:childTnLst>
+        </p:cTn>
+      </p:par>
+    </p:tnLst>
+    <p:bldLst>
+      <p:bldP spid="2" grpId="0"/>
+      <p:bldP spid="3" grpId="0" build="p"/>
+    </p:bldLst>
+  </p:timing>
+</p:sld>
+</file>
+
+<file path=ppt/slides/slide2.xml><?xml version="1.0" encoding="utf-8"?>
+<p:sld xmlns:a="http://schemas.openxmlformats.org/drawingml/2006/main" xmlns:r="http://schemas.openxmlformats.org/officeDocument/2006/relationships" xmlns:p="http://schemas.openxmlformats.org/presentationml/2006/main">
+  <p:cSld>
+    <p:spTree>
+      <p:nvGrpSpPr>
+        <p:cNvPr id="1" name=""/>
+        <p:cNvGrpSpPr/>
+        <p:nvPr/>
+      </p:nvGrpSpPr>
+      <p:grpSpPr>
+        <a:xfrm>
+          <a:off x="0" y="0"/>
+          <a:ext cx="0" cy="0"/>
+          <a:chOff x="0" y="0"/>
+          <a:chExt cx="0" cy="0"/>
+        </a:xfrm>
+      </p:grpSpPr>
+      <p:sp>
+        <p:nvSpPr>
+          <p:cNvPr id="2" name="Title 1">
+            <a:extLst>
+              <a:ext uri="{FF2B5EF4-FFF2-40B4-BE49-F238E27FC236}">
+                <a16:creationId xmlns:a16="http://schemas.microsoft.com/office/drawing/2014/main" id="{EC4708AC-CB6A-EE3C-8436-76AA8E746FF5}"/>
+              </a:ext>
+            </a:extLst>
+          </p:cNvPr>
+          <p:cNvSpPr>
+            <a:spLocks noGrp="1"/>
+          </p:cNvSpPr>
+          <p:nvPr>
+            <p:ph type="title"/>
+          </p:nvPr>
+        </p:nvSpPr>
+        <p:spPr/>
+        <p:txBody>
+          <a:bodyPr>
+            <a:normAutofit fontScale="90000"/>
+          </a:bodyPr>
+          <a:lstStyle/>
+          <a:p>
+            <a:br>
+              <a:rPr lang="en-AU" sz="5400" b="1" dirty="0">
+                <a:effectLst/>
+                <a:latin typeface="Calibri" panose="020F0502020204030204" pitchFamily="34" charset="0"/>
+                <a:ea typeface="Calibri" panose="020F0502020204030204" pitchFamily="34" charset="0"/>
+                <a:cs typeface="Times New Roman" panose="02020603050405020304" pitchFamily="18" charset="0"/>
+              </a:rPr>
+            </a:br>
+            <a:r>
+              <a:rPr lang="en-AU" sz="5400" b="1" dirty="0">
+                <a:effectLst/>
+                <a:latin typeface="Calibri" panose="020F0502020204030204" pitchFamily="34" charset="0"/>
+                <a:ea typeface="Calibri" panose="020F0502020204030204" pitchFamily="34" charset="0"/>
+                <a:cs typeface="Times New Roman" panose="02020603050405020304" pitchFamily="18" charset="0"/>
+              </a:rPr>
+              <a:t>Title: </a:t>
+            </a:r>
+            <a:r>
+              <a:rPr lang="en-AU" sz="5400" dirty="0">
+                <a:effectLst/>
+                <a:latin typeface="Calibri" panose="020F0502020204030204" pitchFamily="34" charset="0"/>
+                <a:ea typeface="Calibri" panose="020F0502020204030204" pitchFamily="34" charset="0"/>
+                <a:cs typeface="Times New Roman" panose="02020603050405020304" pitchFamily="18" charset="0"/>
+              </a:rPr>
+              <a:t>Share Price Prediction</a:t>
+            </a:r>
+            <a:br>
+              <a:rPr lang="en-AU" sz="5400" dirty="0">
+                <a:effectLst/>
+                <a:latin typeface="Calibri" panose="020F0502020204030204" pitchFamily="34" charset="0"/>
+                <a:ea typeface="Calibri" panose="020F0502020204030204" pitchFamily="34" charset="0"/>
+                <a:cs typeface="Times New Roman" panose="02020603050405020304" pitchFamily="18" charset="0"/>
+              </a:rPr>
+            </a:br>
+            <a:endParaRPr lang="en-AU" dirty="0"/>
+          </a:p>
+        </p:txBody>
+      </p:sp>
+      <p:sp>
+        <p:nvSpPr>
+          <p:cNvPr id="3" name="Content Placeholder 2">
+            <a:extLst>
+              <a:ext uri="{FF2B5EF4-FFF2-40B4-BE49-F238E27FC236}">
+                <a16:creationId xmlns:a16="http://schemas.microsoft.com/office/drawing/2014/main" id="{36380F6B-F9EE-1E93-4E5A-B7CD02D67C57}"/>
+              </a:ext>
+            </a:extLst>
+          </p:cNvPr>
+          <p:cNvSpPr>
+            <a:spLocks noGrp="1"/>
+          </p:cNvSpPr>
+          <p:nvPr>
+            <p:ph idx="1"/>
+          </p:nvPr>
+        </p:nvSpPr>
+        <p:spPr/>
+        <p:txBody>
+          <a:bodyPr>
+            <a:normAutofit/>
+          </a:bodyPr>
+          <a:lstStyle/>
+          <a:p>
+            <a:pPr>
+              <a:lnSpc>
+                <a:spcPct val="107000"/>
+              </a:lnSpc>
+              <a:spcAft>
+                <a:spcPts val="800"/>
+              </a:spcAft>
+            </a:pPr>
+            <a:r>
+              <a:rPr lang="en-AU" sz="4300" b="1" dirty="0">
+                <a:latin typeface="Calibri" panose="020F0502020204030204" pitchFamily="34" charset="0"/>
+                <a:cs typeface="Times New Roman" panose="02020603050405020304" pitchFamily="18" charset="0"/>
+              </a:rPr>
+              <a:t>Dataset: </a:t>
+            </a:r>
+            <a:r>
+              <a:rPr lang="en-AU" sz="2800" dirty="0">
+                <a:solidFill>
+                  <a:srgbClr val="292929"/>
+                </a:solidFill>
+                <a:latin typeface="+mj-lt"/>
+              </a:rPr>
+              <a:t>Yahoo Finance history downloads in CSV format saved to </a:t>
+            </a:r>
+            <a:r>
+              <a:rPr lang="en-AU" sz="2800" dirty="0" err="1">
+                <a:solidFill>
+                  <a:srgbClr val="292929"/>
+                </a:solidFill>
+                <a:latin typeface="+mj-lt"/>
+              </a:rPr>
+              <a:t>MongoDb</a:t>
+            </a:r>
+            <a:endParaRPr lang="en-AU" sz="2800" dirty="0">
+              <a:solidFill>
+                <a:srgbClr val="292929"/>
+              </a:solidFill>
+              <a:latin typeface="+mj-lt"/>
+            </a:endParaRPr>
+          </a:p>
+          <a:p>
+            <a:pPr>
+              <a:lnSpc>
+                <a:spcPct val="107000"/>
+              </a:lnSpc>
+              <a:spcAft>
+                <a:spcPts val="800"/>
+              </a:spcAft>
+            </a:pPr>
+            <a:r>
+              <a:rPr lang="en-AU" sz="4300" b="1" dirty="0">
+                <a:latin typeface="Calibri" panose="020F0502020204030204" pitchFamily="34" charset="0"/>
+                <a:cs typeface="Times New Roman" panose="02020603050405020304" pitchFamily="18" charset="0"/>
+              </a:rPr>
+              <a:t>Companies: </a:t>
+            </a:r>
+          </a:p>
+          <a:p>
+            <a:pPr lvl="1">
+              <a:lnSpc>
+                <a:spcPct val="117000"/>
+              </a:lnSpc>
+              <a:spcAft>
+                <a:spcPts val="800"/>
+              </a:spcAft>
+            </a:pPr>
+            <a:r>
+              <a:rPr lang="en-AU" sz="2800" dirty="0">
+                <a:solidFill>
+                  <a:srgbClr val="292929"/>
+                </a:solidFill>
+                <a:latin typeface="+mj-lt"/>
+              </a:rPr>
+              <a:t>Top 5 ASX Share Market Caps</a:t>
+            </a:r>
+          </a:p>
+          <a:p>
+            <a:pPr lvl="1">
+              <a:lnSpc>
+                <a:spcPct val="117000"/>
+              </a:lnSpc>
+              <a:spcAft>
+                <a:spcPts val="800"/>
+              </a:spcAft>
+            </a:pPr>
+            <a:r>
+              <a:rPr lang="en-AU" sz="2800" dirty="0">
+                <a:solidFill>
+                  <a:srgbClr val="292929"/>
+                </a:solidFill>
+                <a:latin typeface="+mj-lt"/>
+              </a:rPr>
+              <a:t>BHP, CBA, CSL, NAB and WBC</a:t>
+            </a:r>
+          </a:p>
+          <a:p>
+            <a:pPr lvl="1">
+              <a:lnSpc>
+                <a:spcPct val="107000"/>
+              </a:lnSpc>
+              <a:spcAft>
+                <a:spcPts val="800"/>
+              </a:spcAft>
+            </a:pPr>
+            <a:r>
+              <a:rPr lang="en-AU" sz="2800" dirty="0">
+                <a:solidFill>
+                  <a:srgbClr val="292929"/>
+                </a:solidFill>
+                <a:latin typeface="+mj-lt"/>
+              </a:rPr>
+              <a:t>Trained models on 20 years past price fluctuations/behaviour</a:t>
+            </a:r>
+          </a:p>
+          <a:p>
+            <a:pPr lvl="1">
+              <a:lnSpc>
+                <a:spcPct val="107000"/>
+              </a:lnSpc>
+              <a:spcAft>
+                <a:spcPts val="800"/>
+              </a:spcAft>
+            </a:pPr>
+            <a:endParaRPr lang="en-AU" sz="2200" dirty="0">
+              <a:latin typeface="Calibri" panose="020F0502020204030204" pitchFamily="34" charset="0"/>
+              <a:cs typeface="Times New Roman" panose="02020603050405020304" pitchFamily="18" charset="0"/>
+            </a:endParaRPr>
+          </a:p>
+          <a:p>
+            <a:pPr lvl="1">
+              <a:lnSpc>
+                <a:spcPct val="107000"/>
+              </a:lnSpc>
+              <a:spcAft>
+                <a:spcPts val="800"/>
+              </a:spcAft>
+            </a:pPr>
+            <a:endParaRPr lang="en-AU" sz="2200" dirty="0">
+              <a:latin typeface="Calibri" panose="020F0502020204030204" pitchFamily="34" charset="0"/>
+              <a:cs typeface="Times New Roman" panose="02020603050405020304" pitchFamily="18" charset="0"/>
+            </a:endParaRPr>
+          </a:p>
+          <a:p>
+            <a:endParaRPr lang="en-AU" dirty="0"/>
+          </a:p>
+        </p:txBody>
+      </p:sp>
+    </p:spTree>
+    <p:extLst>
+      <p:ext uri="{BB962C8B-B14F-4D97-AF65-F5344CB8AC3E}">
+        <p14:creationId xmlns:p14="http://schemas.microsoft.com/office/powerpoint/2010/main" val="2148759867"/>
+      </p:ext>
+    </p:extLst>
+  </p:cSld>
+  <p:clrMapOvr>
+    <a:masterClrMapping/>
+  </p:clrMapOvr>
+  <p:transition spd="slow"/>
+</p:sld>
+</file>
+
+<file path=ppt/slides/slide3.xml><?xml version="1.0" encoding="utf-8"?>
 <p:sld xmlns:a="http://schemas.openxmlformats.org/drawingml/2006/main" xmlns:r="http://schemas.openxmlformats.org/officeDocument/2006/relationships" xmlns:p="http://schemas.openxmlformats.org/presentationml/2006/main">
   <p:cSld>
     <p:bg>
@@ -5376,7 +6680,7 @@
                   <a:srgbClr val="FFFFFF"/>
                 </a:solidFill>
               </a:rPr>
-              <a:t>MACHINE LEARNING</a:t>
+              <a:t>“Memory is deceptive because it is coloured by today’s events.”</a:t>
             </a:r>
           </a:p>
         </p:txBody>
@@ -5409,23 +6713,20 @@
           </a:bodyPr>
           <a:lstStyle/>
           <a:p>
+            <a:endParaRPr lang="en-AU" dirty="0">
+              <a:solidFill>
+                <a:srgbClr val="FFFFFF"/>
+              </a:solidFill>
+            </a:endParaRPr>
+          </a:p>
+          <a:p>
             <a:r>
               <a:rPr lang="en-AU" dirty="0">
                 <a:solidFill>
                   <a:srgbClr val="FFFFFF"/>
                 </a:solidFill>
               </a:rPr>
-              <a:t>Share Price Prediction</a:t>
-            </a:r>
-          </a:p>
-          <a:p>
-            <a:r>
-              <a:rPr lang="en-AU" dirty="0">
-                <a:solidFill>
-                  <a:srgbClr val="FFFFFF"/>
-                </a:solidFill>
-              </a:rPr>
-              <a:t>By Antoinette and Stella</a:t>
+              <a:t>Albert Einstein</a:t>
             </a:r>
           </a:p>
         </p:txBody>
@@ -5433,7 +6734,7 @@
     </p:spTree>
     <p:extLst>
       <p:ext uri="{BB962C8B-B14F-4D97-AF65-F5344CB8AC3E}">
-        <p14:creationId xmlns:p14="http://schemas.microsoft.com/office/powerpoint/2010/main" val="2908876239"/>
+        <p14:creationId xmlns:p14="http://schemas.microsoft.com/office/powerpoint/2010/main" val="1148623184"/>
       </p:ext>
     </p:extLst>
   </p:cSld>
@@ -5448,321 +6749,6 @@
       <p:transition/>
     </mc:Fallback>
   </mc:AlternateContent>
-</p:sld>
-</file>
-
-<file path=ppt/slides/slide2.xml><?xml version="1.0" encoding="utf-8"?>
-<p:sld xmlns:a="http://schemas.openxmlformats.org/drawingml/2006/main" xmlns:r="http://schemas.openxmlformats.org/officeDocument/2006/relationships" xmlns:p="http://schemas.openxmlformats.org/presentationml/2006/main">
-  <p:cSld>
-    <p:spTree>
-      <p:nvGrpSpPr>
-        <p:cNvPr id="1" name=""/>
-        <p:cNvGrpSpPr/>
-        <p:nvPr/>
-      </p:nvGrpSpPr>
-      <p:grpSpPr>
-        <a:xfrm>
-          <a:off x="0" y="0"/>
-          <a:ext cx="0" cy="0"/>
-          <a:chOff x="0" y="0"/>
-          <a:chExt cx="0" cy="0"/>
-        </a:xfrm>
-      </p:grpSpPr>
-      <p:sp>
-        <p:nvSpPr>
-          <p:cNvPr id="2" name="Title 1">
-            <a:extLst>
-              <a:ext uri="{FF2B5EF4-FFF2-40B4-BE49-F238E27FC236}">
-                <a16:creationId xmlns:a16="http://schemas.microsoft.com/office/drawing/2014/main" id="{EC4708AC-CB6A-EE3C-8436-76AA8E746FF5}"/>
-              </a:ext>
-            </a:extLst>
-          </p:cNvPr>
-          <p:cNvSpPr>
-            <a:spLocks noGrp="1"/>
-          </p:cNvSpPr>
-          <p:nvPr>
-            <p:ph type="title"/>
-          </p:nvPr>
-        </p:nvSpPr>
-        <p:spPr/>
-        <p:txBody>
-          <a:bodyPr>
-            <a:normAutofit fontScale="90000"/>
-          </a:bodyPr>
-          <a:lstStyle/>
-          <a:p>
-            <a:r>
-              <a:rPr lang="en-AU" sz="5400" b="1" dirty="0">
-                <a:effectLst/>
-                <a:latin typeface="Calibri" panose="020F0502020204030204" pitchFamily="34" charset="0"/>
-                <a:ea typeface="Calibri" panose="020F0502020204030204" pitchFamily="34" charset="0"/>
-                <a:cs typeface="Times New Roman" panose="02020603050405020304" pitchFamily="18" charset="0"/>
-              </a:rPr>
-              <a:t>PROJECT 3 DEMYSTIFYING ML</a:t>
-            </a:r>
-            <a:br>
-              <a:rPr lang="en-AU" sz="5400" dirty="0">
-                <a:effectLst/>
-                <a:latin typeface="Calibri" panose="020F0502020204030204" pitchFamily="34" charset="0"/>
-                <a:ea typeface="Calibri" panose="020F0502020204030204" pitchFamily="34" charset="0"/>
-                <a:cs typeface="Times New Roman" panose="02020603050405020304" pitchFamily="18" charset="0"/>
-              </a:rPr>
-            </a:br>
-            <a:endParaRPr lang="en-AU" dirty="0"/>
-          </a:p>
-        </p:txBody>
-      </p:sp>
-      <p:sp>
-        <p:nvSpPr>
-          <p:cNvPr id="3" name="Content Placeholder 2">
-            <a:extLst>
-              <a:ext uri="{FF2B5EF4-FFF2-40B4-BE49-F238E27FC236}">
-                <a16:creationId xmlns:a16="http://schemas.microsoft.com/office/drawing/2014/main" id="{36380F6B-F9EE-1E93-4E5A-B7CD02D67C57}"/>
-              </a:ext>
-            </a:extLst>
-          </p:cNvPr>
-          <p:cNvSpPr>
-            <a:spLocks noGrp="1"/>
-          </p:cNvSpPr>
-          <p:nvPr>
-            <p:ph idx="1"/>
-          </p:nvPr>
-        </p:nvSpPr>
-        <p:spPr/>
-        <p:txBody>
-          <a:bodyPr/>
-          <a:lstStyle/>
-          <a:p>
-            <a:pPr>
-              <a:lnSpc>
-                <a:spcPct val="107000"/>
-              </a:lnSpc>
-              <a:spcAft>
-                <a:spcPts val="800"/>
-              </a:spcAft>
-            </a:pPr>
-            <a:r>
-              <a:rPr lang="en-AU" sz="2400" b="1" dirty="0">
-                <a:effectLst/>
-                <a:latin typeface="Calibri" panose="020F0502020204030204" pitchFamily="34" charset="0"/>
-                <a:ea typeface="Calibri" panose="020F0502020204030204" pitchFamily="34" charset="0"/>
-                <a:cs typeface="Times New Roman" panose="02020603050405020304" pitchFamily="18" charset="0"/>
-              </a:rPr>
-              <a:t>Team members</a:t>
-            </a:r>
-            <a:r>
-              <a:rPr lang="en-AU" sz="2400" dirty="0">
-                <a:effectLst/>
-                <a:latin typeface="Calibri" panose="020F0502020204030204" pitchFamily="34" charset="0"/>
-                <a:ea typeface="Calibri" panose="020F0502020204030204" pitchFamily="34" charset="0"/>
-                <a:cs typeface="Times New Roman" panose="02020603050405020304" pitchFamily="18" charset="0"/>
-              </a:rPr>
-              <a:t>: Antoinette Boyle, Stella Schubert</a:t>
-            </a:r>
-          </a:p>
-          <a:p>
-            <a:pPr>
-              <a:lnSpc>
-                <a:spcPct val="107000"/>
-              </a:lnSpc>
-              <a:spcAft>
-                <a:spcPts val="800"/>
-              </a:spcAft>
-            </a:pPr>
-            <a:r>
-              <a:rPr lang="en-AU" sz="2400" b="1" dirty="0">
-                <a:effectLst/>
-                <a:latin typeface="Calibri" panose="020F0502020204030204" pitchFamily="34" charset="0"/>
-                <a:ea typeface="Calibri" panose="020F0502020204030204" pitchFamily="34" charset="0"/>
-                <a:cs typeface="Times New Roman" panose="02020603050405020304" pitchFamily="18" charset="0"/>
-              </a:rPr>
-              <a:t>Title: Analysing the Top 5 ASX Share Market Capitalisation Companies</a:t>
-            </a:r>
-            <a:endParaRPr lang="en-AU" sz="2400" dirty="0">
-              <a:effectLst/>
-              <a:latin typeface="Calibri" panose="020F0502020204030204" pitchFamily="34" charset="0"/>
-              <a:ea typeface="Calibri" panose="020F0502020204030204" pitchFamily="34" charset="0"/>
-              <a:cs typeface="Times New Roman" panose="02020603050405020304" pitchFamily="18" charset="0"/>
-            </a:endParaRPr>
-          </a:p>
-          <a:p>
-            <a:pPr>
-              <a:lnSpc>
-                <a:spcPct val="107000"/>
-              </a:lnSpc>
-              <a:spcAft>
-                <a:spcPts val="800"/>
-              </a:spcAft>
-            </a:pPr>
-            <a:r>
-              <a:rPr lang="en-AU" sz="2400" b="1" dirty="0">
-                <a:effectLst/>
-                <a:latin typeface="Calibri" panose="020F0502020204030204" pitchFamily="34" charset="0"/>
-                <a:ea typeface="Calibri" panose="020F0502020204030204" pitchFamily="34" charset="0"/>
-                <a:cs typeface="Times New Roman" panose="02020603050405020304" pitchFamily="18" charset="0"/>
-              </a:rPr>
-              <a:t>Dataset:</a:t>
-            </a:r>
-            <a:r>
-              <a:rPr lang="en-AU" sz="2400" dirty="0">
-                <a:effectLst/>
-                <a:latin typeface="Calibri" panose="020F0502020204030204" pitchFamily="34" charset="0"/>
-                <a:ea typeface="Calibri" panose="020F0502020204030204" pitchFamily="34" charset="0"/>
-                <a:cs typeface="Times New Roman" panose="02020603050405020304" pitchFamily="18" charset="0"/>
-              </a:rPr>
-              <a:t> Yahoo Finance history downloads</a:t>
-            </a:r>
-          </a:p>
-          <a:p>
-            <a:pPr>
-              <a:lnSpc>
-                <a:spcPct val="107000"/>
-              </a:lnSpc>
-              <a:spcAft>
-                <a:spcPts val="800"/>
-              </a:spcAft>
-            </a:pPr>
-            <a:r>
-              <a:rPr lang="en-AU" sz="2400" b="1" dirty="0">
-                <a:latin typeface="Calibri" panose="020F0502020204030204" pitchFamily="34" charset="0"/>
-                <a:cs typeface="Times New Roman" panose="02020603050405020304" pitchFamily="18" charset="0"/>
-              </a:rPr>
-              <a:t>Companies: BHP, CBA, CSL, NAB and WBC</a:t>
-            </a:r>
-          </a:p>
-          <a:p>
-            <a:endParaRPr lang="en-AU" dirty="0"/>
-          </a:p>
-        </p:txBody>
-      </p:sp>
-    </p:spTree>
-    <p:extLst>
-      <p:ext uri="{BB962C8B-B14F-4D97-AF65-F5344CB8AC3E}">
-        <p14:creationId xmlns:p14="http://schemas.microsoft.com/office/powerpoint/2010/main" val="2148759867"/>
-      </p:ext>
-    </p:extLst>
-  </p:cSld>
-  <p:clrMapOvr>
-    <a:masterClrMapping/>
-  </p:clrMapOvr>
-  <p:transition spd="slow"/>
-</p:sld>
-</file>
-
-<file path=ppt/slides/slide3.xml><?xml version="1.0" encoding="utf-8"?>
-<p:sld xmlns:a="http://schemas.openxmlformats.org/drawingml/2006/main" xmlns:r="http://schemas.openxmlformats.org/officeDocument/2006/relationships" xmlns:p="http://schemas.openxmlformats.org/presentationml/2006/main">
-  <p:cSld>
-    <p:spTree>
-      <p:nvGrpSpPr>
-        <p:cNvPr id="1" name=""/>
-        <p:cNvGrpSpPr/>
-        <p:nvPr/>
-      </p:nvGrpSpPr>
-      <p:grpSpPr>
-        <a:xfrm>
-          <a:off x="0" y="0"/>
-          <a:ext cx="0" cy="0"/>
-          <a:chOff x="0" y="0"/>
-          <a:chExt cx="0" cy="0"/>
-        </a:xfrm>
-      </p:grpSpPr>
-      <p:sp>
-        <p:nvSpPr>
-          <p:cNvPr id="2" name="Title 1">
-            <a:extLst>
-              <a:ext uri="{FF2B5EF4-FFF2-40B4-BE49-F238E27FC236}">
-                <a16:creationId xmlns:a16="http://schemas.microsoft.com/office/drawing/2014/main" id="{ABAF69E0-8289-8816-603B-9F03C07EC799}"/>
-              </a:ext>
-            </a:extLst>
-          </p:cNvPr>
-          <p:cNvSpPr>
-            <a:spLocks noGrp="1"/>
-          </p:cNvSpPr>
-          <p:nvPr>
-            <p:ph type="title"/>
-          </p:nvPr>
-        </p:nvSpPr>
-        <p:spPr/>
-        <p:txBody>
-          <a:bodyPr/>
-          <a:lstStyle/>
-          <a:p>
-            <a:r>
-              <a:rPr lang="en-AU" dirty="0"/>
-              <a:t>Data</a:t>
-            </a:r>
-          </a:p>
-        </p:txBody>
-      </p:sp>
-      <p:sp>
-        <p:nvSpPr>
-          <p:cNvPr id="3" name="Content Placeholder 2">
-            <a:extLst>
-              <a:ext uri="{FF2B5EF4-FFF2-40B4-BE49-F238E27FC236}">
-                <a16:creationId xmlns:a16="http://schemas.microsoft.com/office/drawing/2014/main" id="{02CAF13E-A00A-2CA4-D390-897A4071F484}"/>
-              </a:ext>
-            </a:extLst>
-          </p:cNvPr>
-          <p:cNvSpPr>
-            <a:spLocks noGrp="1"/>
-          </p:cNvSpPr>
-          <p:nvPr>
-            <p:ph idx="1"/>
-          </p:nvPr>
-        </p:nvSpPr>
-        <p:spPr/>
-        <p:txBody>
-          <a:bodyPr/>
-          <a:lstStyle/>
-          <a:p>
-            <a:endParaRPr lang="en-AU" dirty="0"/>
-          </a:p>
-          <a:p>
-            <a:r>
-              <a:rPr lang="en-AU" sz="3600" dirty="0">
-                <a:effectLst/>
-                <a:latin typeface="Calibri" panose="020F0502020204030204" pitchFamily="34" charset="0"/>
-                <a:ea typeface="Calibri" panose="020F0502020204030204" pitchFamily="34" charset="0"/>
-                <a:cs typeface="Times New Roman" panose="02020603050405020304" pitchFamily="18" charset="0"/>
-              </a:rPr>
-              <a:t>Yahoo Finance history downloads</a:t>
-            </a:r>
-          </a:p>
-          <a:p>
-            <a:r>
-              <a:rPr lang="en-AU" sz="3600" dirty="0">
-                <a:latin typeface="Calibri" panose="020F0502020204030204" pitchFamily="34" charset="0"/>
-                <a:cs typeface="Times New Roman" panose="02020603050405020304" pitchFamily="18" charset="0"/>
-              </a:rPr>
-              <a:t>CSV format</a:t>
-            </a:r>
-            <a:endParaRPr lang="en-AU" sz="3600" dirty="0"/>
-          </a:p>
-          <a:p>
-            <a:r>
-              <a:rPr lang="en-AU" sz="3600" dirty="0"/>
-              <a:t>ETL </a:t>
-            </a:r>
-          </a:p>
-          <a:p>
-            <a:r>
-              <a:rPr lang="en-AU" sz="3600" dirty="0"/>
-              <a:t>Mongo Db</a:t>
-            </a:r>
-          </a:p>
-        </p:txBody>
-      </p:sp>
-    </p:spTree>
-    <p:extLst>
-      <p:ext uri="{BB962C8B-B14F-4D97-AF65-F5344CB8AC3E}">
-        <p14:creationId xmlns:p14="http://schemas.microsoft.com/office/powerpoint/2010/main" val="3434238687"/>
-      </p:ext>
-    </p:extLst>
-  </p:cSld>
-  <p:clrMapOvr>
-    <a:masterClrMapping/>
-  </p:clrMapOvr>
-  <p:transition spd="slow"/>
 </p:sld>
 </file>
 
@@ -5788,7 +6774,7 @@
           <p:cNvPr id="2" name="Title 1">
             <a:extLst>
               <a:ext uri="{FF2B5EF4-FFF2-40B4-BE49-F238E27FC236}">
-                <a16:creationId xmlns:a16="http://schemas.microsoft.com/office/drawing/2014/main" id="{F1FF3A0B-9197-1C93-3EF1-6D1913C6CAF2}"/>
+                <a16:creationId xmlns:a16="http://schemas.microsoft.com/office/drawing/2014/main" id="{96FFE617-EE5D-1295-2D8A-A3E3B3654BCA}"/>
               </a:ext>
             </a:extLst>
           </p:cNvPr>
@@ -5801,62 +6787,214 @@
         </p:nvSpPr>
         <p:spPr/>
         <p:txBody>
-          <a:bodyPr/>
+          <a:bodyPr>
+            <a:normAutofit/>
+          </a:bodyPr>
           <a:lstStyle/>
           <a:p>
             <a:r>
-              <a:rPr lang="en-AU" dirty="0"/>
-              <a:t>AWS</a:t>
-            </a:r>
-          </a:p>
-        </p:txBody>
-      </p:sp>
-      <p:pic>
-        <p:nvPicPr>
-          <p:cNvPr id="5" name="Content Placeholder 4" descr="Graphical user interface, diagram&#10;&#10;Description automatically generated">
-            <a:extLst>
-              <a:ext uri="{FF2B5EF4-FFF2-40B4-BE49-F238E27FC236}">
-                <a16:creationId xmlns:a16="http://schemas.microsoft.com/office/drawing/2014/main" id="{4B83803B-8148-4185-5824-CA7277DFF49D}"/>
-              </a:ext>
-            </a:extLst>
-          </p:cNvPr>
-          <p:cNvPicPr>
-            <a:picLocks noGrp="1" noChangeAspect="1"/>
-          </p:cNvPicPr>
+              <a:rPr lang="en-AU" sz="4800" b="1" dirty="0">
+                <a:latin typeface="+mn-lt"/>
+              </a:rPr>
+              <a:t>Model?</a:t>
+            </a:r>
+          </a:p>
+        </p:txBody>
+      </p:sp>
+      <p:sp>
+        <p:nvSpPr>
+          <p:cNvPr id="3" name="Content Placeholder 2">
+            <a:extLst>
+              <a:ext uri="{FF2B5EF4-FFF2-40B4-BE49-F238E27FC236}">
+                <a16:creationId xmlns:a16="http://schemas.microsoft.com/office/drawing/2014/main" id="{123049A9-5A71-61A5-9C77-7AC20233FFCE}"/>
+              </a:ext>
+            </a:extLst>
+          </p:cNvPr>
+          <p:cNvSpPr>
+            <a:spLocks noGrp="1"/>
+          </p:cNvSpPr>
           <p:nvPr>
             <p:ph idx="1"/>
           </p:nvPr>
-        </p:nvPicPr>
-        <p:blipFill>
-          <a:blip r:embed="rId2">
-            <a:extLst>
-              <a:ext uri="{28A0092B-C50C-407E-A947-70E740481C1C}">
-                <a14:useLocalDpi xmlns:a14="http://schemas.microsoft.com/office/drawing/2010/main" val="0"/>
-              </a:ext>
-            </a:extLst>
-          </a:blip>
-          <a:stretch>
-            <a:fillRect/>
-          </a:stretch>
-        </p:blipFill>
-        <p:spPr>
-          <a:xfrm>
-            <a:off x="777240" y="1391920"/>
-            <a:ext cx="10659110" cy="5343843"/>
-          </a:xfrm>
-        </p:spPr>
-      </p:pic>
+        </p:nvSpPr>
+        <p:spPr/>
+        <p:txBody>
+          <a:bodyPr>
+            <a:normAutofit/>
+          </a:bodyPr>
+          <a:lstStyle/>
+          <a:p>
+            <a:pPr marL="0" indent="0">
+              <a:buNone/>
+            </a:pPr>
+            <a:endParaRPr lang="en-AU" sz="3200" b="0" i="0" dirty="0">
+              <a:solidFill>
+                <a:srgbClr val="292929"/>
+              </a:solidFill>
+              <a:effectLst/>
+              <a:latin typeface="+mj-lt"/>
+            </a:endParaRPr>
+          </a:p>
+          <a:p>
+            <a:pPr marL="514350" indent="-514350">
+              <a:buFont typeface="+mj-lt"/>
+              <a:buAutoNum type="arabicPeriod"/>
+            </a:pPr>
+            <a:r>
+              <a:rPr lang="en-AU" sz="3200" dirty="0">
+                <a:solidFill>
+                  <a:srgbClr val="292929"/>
+                </a:solidFill>
+                <a:latin typeface="+mj-lt"/>
+              </a:rPr>
+              <a:t>Long short-term memory (LSTM</a:t>
+            </a:r>
+            <a:r>
+              <a:rPr lang="en-AU" sz="3200" b="0" i="0" dirty="0">
+                <a:solidFill>
+                  <a:srgbClr val="292929"/>
+                </a:solidFill>
+                <a:effectLst/>
+                <a:latin typeface="+mj-lt"/>
+              </a:rPr>
+              <a:t>)</a:t>
+            </a:r>
+          </a:p>
+          <a:p>
+            <a:pPr lvl="1"/>
+            <a:r>
+              <a:rPr lang="en-AU" sz="3000" spc="-5" dirty="0">
+                <a:solidFill>
+                  <a:srgbClr val="292929"/>
+                </a:solidFill>
+                <a:latin typeface="+mj-lt"/>
+                <a:cs typeface="Times New Roman" panose="02020603050405020304" pitchFamily="18" charset="0"/>
+              </a:rPr>
+              <a:t>Predict next day price using last 60 days</a:t>
+            </a:r>
+          </a:p>
+          <a:p>
+            <a:pPr marL="457200" lvl="1" indent="0">
+              <a:buNone/>
+            </a:pPr>
+            <a:endParaRPr lang="en-AU" sz="3000" b="0" i="0" dirty="0">
+              <a:solidFill>
+                <a:srgbClr val="292929"/>
+              </a:solidFill>
+              <a:effectLst/>
+              <a:latin typeface="+mj-lt"/>
+            </a:endParaRPr>
+          </a:p>
+          <a:p>
+            <a:pPr marL="514350" indent="-514350">
+              <a:buFont typeface="+mj-lt"/>
+              <a:buAutoNum type="arabicPeriod"/>
+            </a:pPr>
+            <a:r>
+              <a:rPr lang="en-AU" sz="3200" dirty="0">
+                <a:solidFill>
+                  <a:srgbClr val="292929"/>
+                </a:solidFill>
+                <a:latin typeface="+mj-lt"/>
+              </a:rPr>
+              <a:t>Random </a:t>
+            </a:r>
+            <a:r>
+              <a:rPr lang="en-AU" sz="3200" spc="-5" dirty="0">
+                <a:solidFill>
+                  <a:srgbClr val="292929"/>
+                </a:solidFill>
+                <a:latin typeface="+mj-lt"/>
+                <a:cs typeface="Times New Roman" panose="02020603050405020304" pitchFamily="18" charset="0"/>
+              </a:rPr>
+              <a:t>Forest Regression</a:t>
+            </a:r>
+          </a:p>
+          <a:p>
+            <a:pPr lvl="1"/>
+            <a:r>
+              <a:rPr lang="en-AU" sz="3000" spc="-5" dirty="0">
+                <a:solidFill>
+                  <a:srgbClr val="292929"/>
+                </a:solidFill>
+                <a:latin typeface="+mj-lt"/>
+                <a:cs typeface="Times New Roman" panose="02020603050405020304" pitchFamily="18" charset="0"/>
+              </a:rPr>
+              <a:t>Predict share price based on given Interest rate and CPI</a:t>
+            </a:r>
+            <a:endParaRPr lang="en-AU" sz="3400" b="0" i="0" dirty="0">
+              <a:solidFill>
+                <a:srgbClr val="292929"/>
+              </a:solidFill>
+              <a:effectLst/>
+              <a:latin typeface="+mj-lt"/>
+            </a:endParaRPr>
+          </a:p>
+          <a:p>
+            <a:pPr marL="514350" indent="-514350">
+              <a:buFont typeface="+mj-lt"/>
+              <a:buAutoNum type="arabicPeriod"/>
+            </a:pPr>
+            <a:endParaRPr lang="en-AU" sz="3200" spc="-5" dirty="0">
+              <a:solidFill>
+                <a:srgbClr val="292929"/>
+              </a:solidFill>
+              <a:latin typeface="+mj-lt"/>
+              <a:cs typeface="Times New Roman" panose="02020603050405020304" pitchFamily="18" charset="0"/>
+            </a:endParaRPr>
+          </a:p>
+          <a:p>
+            <a:pPr marL="514350" indent="-514350">
+              <a:buFont typeface="+mj-lt"/>
+              <a:buAutoNum type="arabicPeriod"/>
+            </a:pPr>
+            <a:endParaRPr lang="en-AU" sz="3200" b="0" i="0" dirty="0">
+              <a:solidFill>
+                <a:srgbClr val="292929"/>
+              </a:solidFill>
+              <a:effectLst/>
+              <a:latin typeface="+mj-lt"/>
+            </a:endParaRPr>
+          </a:p>
+          <a:p>
+            <a:pPr marL="514350" indent="-514350">
+              <a:buFont typeface="+mj-lt"/>
+              <a:buAutoNum type="arabicPeriod"/>
+            </a:pPr>
+            <a:endParaRPr lang="en-AU" sz="3200" spc="-5" dirty="0">
+              <a:solidFill>
+                <a:srgbClr val="292929"/>
+              </a:solidFill>
+              <a:effectLst/>
+              <a:latin typeface="+mj-lt"/>
+              <a:ea typeface="Calibri" panose="020F0502020204030204" pitchFamily="34" charset="0"/>
+              <a:cs typeface="Times New Roman" panose="02020603050405020304" pitchFamily="18" charset="0"/>
+            </a:endParaRPr>
+          </a:p>
+        </p:txBody>
+      </p:sp>
     </p:spTree>
     <p:extLst>
       <p:ext uri="{BB962C8B-B14F-4D97-AF65-F5344CB8AC3E}">
-        <p14:creationId xmlns:p14="http://schemas.microsoft.com/office/powerpoint/2010/main" val="2641720610"/>
+        <p14:creationId xmlns:p14="http://schemas.microsoft.com/office/powerpoint/2010/main" val="3956008943"/>
       </p:ext>
     </p:extLst>
   </p:cSld>
   <p:clrMapOvr>
     <a:masterClrMapping/>
   </p:clrMapOvr>
-  <p:transition spd="slow"/>
+  <mc:AlternateContent xmlns:mc="http://schemas.openxmlformats.org/markup-compatibility/2006" xmlns:p159="http://schemas.microsoft.com/office/powerpoint/2015/09/main">
+    <mc:Choice Requires="p159">
+      <p:transition xmlns:p14="http://schemas.microsoft.com/office/powerpoint/2010/main" spd="slow" p14:dur="1250">
+        <p159:morph option="byObject"/>
+      </p:transition>
+    </mc:Choice>
+    <mc:Fallback xmlns="">
+      <p:transition spd="slow">
+        <p:fade/>
+      </p:transition>
+    </mc:Fallback>
+  </mc:AlternateContent>
 </p:sld>
 </file>
 
@@ -5882,7 +7020,7 @@
           <p:cNvPr id="2" name="Title 1">
             <a:extLst>
               <a:ext uri="{FF2B5EF4-FFF2-40B4-BE49-F238E27FC236}">
-                <a16:creationId xmlns:a16="http://schemas.microsoft.com/office/drawing/2014/main" id="{96FFE617-EE5D-1295-2D8A-A3E3B3654BCA}"/>
+                <a16:creationId xmlns:a16="http://schemas.microsoft.com/office/drawing/2014/main" id="{EB9F7006-FA55-0C62-B8C2-01336E2FB8E4}"/>
               </a:ext>
             </a:extLst>
           </p:cNvPr>
@@ -5900,8 +7038,9 @@
           <a:p>
             <a:r>
               <a:rPr lang="en-AU" dirty="0"/>
-              <a:t>Which Model?</a:t>
-            </a:r>
+              <a:t>Behind the Website</a:t>
+            </a:r>
+            <a:endParaRPr lang="en-AU" sz="5400" dirty="0"/>
           </a:p>
         </p:txBody>
       </p:sp>
@@ -5910,7 +7049,7 @@
           <p:cNvPr id="3" name="Content Placeholder 2">
             <a:extLst>
               <a:ext uri="{FF2B5EF4-FFF2-40B4-BE49-F238E27FC236}">
-                <a16:creationId xmlns:a16="http://schemas.microsoft.com/office/drawing/2014/main" id="{123049A9-5A71-61A5-9C77-7AC20233FFCE}"/>
+                <a16:creationId xmlns:a16="http://schemas.microsoft.com/office/drawing/2014/main" id="{0D8E844B-D935-5247-65FD-F11288A4ED48}"/>
               </a:ext>
             </a:extLst>
           </p:cNvPr>
@@ -5929,167 +7068,116 @@
           <a:lstStyle/>
           <a:p>
             <a:r>
-              <a:rPr lang="en-AU" sz="3200" b="0" i="0" dirty="0">
-                <a:solidFill>
-                  <a:srgbClr val="292929"/>
-                </a:solidFill>
-                <a:effectLst/>
-                <a:latin typeface="+mj-lt"/>
-              </a:rPr>
-              <a:t>Sequential Model</a:t>
-            </a:r>
-          </a:p>
-          <a:p>
-            <a:r>
-              <a:rPr lang="en-AU" sz="3200" b="0" i="0" dirty="0">
-                <a:solidFill>
-                  <a:srgbClr val="292929"/>
-                </a:solidFill>
-                <a:effectLst/>
-                <a:latin typeface="+mj-lt"/>
-              </a:rPr>
-              <a:t>Long short-term memory (LSTM)</a:t>
-            </a:r>
-          </a:p>
-          <a:p>
-            <a:r>
-              <a:rPr lang="en-AU" sz="3200" spc="-5" dirty="0">
-                <a:solidFill>
-                  <a:srgbClr val="292929"/>
-                </a:solidFill>
-                <a:latin typeface="+mj-lt"/>
-                <a:ea typeface="Calibri" panose="020F0502020204030204" pitchFamily="34" charset="0"/>
-                <a:cs typeface="Times New Roman" panose="02020603050405020304" pitchFamily="18" charset="0"/>
-              </a:rPr>
-              <a:t>R</a:t>
-            </a:r>
-            <a:r>
-              <a:rPr lang="en-AU" sz="3200" spc="-5" dirty="0">
-                <a:solidFill>
-                  <a:srgbClr val="292929"/>
-                </a:solidFill>
-                <a:effectLst/>
-                <a:latin typeface="+mj-lt"/>
-                <a:ea typeface="Calibri" panose="020F0502020204030204" pitchFamily="34" charset="0"/>
-                <a:cs typeface="Times New Roman" panose="02020603050405020304" pitchFamily="18" charset="0"/>
-              </a:rPr>
-              <a:t>ecurrent neural network (RNN) architecture</a:t>
-            </a:r>
-          </a:p>
-          <a:p>
-            <a:r>
-              <a:rPr lang="en-AU" sz="3200" spc="-5" dirty="0">
-                <a:solidFill>
-                  <a:srgbClr val="292929"/>
-                </a:solidFill>
-                <a:latin typeface="+mj-lt"/>
-                <a:cs typeface="Times New Roman" panose="02020603050405020304" pitchFamily="18" charset="0"/>
-              </a:rPr>
-              <a:t>Share price prediction using a weighted average over 60 days</a:t>
-            </a:r>
-          </a:p>
-          <a:p>
-            <a:pPr marL="342900" lvl="0" indent="-342900">
-              <a:lnSpc>
-                <a:spcPct val="107000"/>
-              </a:lnSpc>
+              <a:rPr lang="en-AU" sz="3600" dirty="0"/>
+              <a:t>HTML, CSS and Bootstrap</a:t>
+            </a:r>
+          </a:p>
+          <a:p>
+            <a:r>
+              <a:rPr lang="en-AU" sz="3600" dirty="0"/>
+              <a:t>Flask – app.py</a:t>
+            </a:r>
+          </a:p>
+          <a:p>
+            <a:r>
+              <a:rPr lang="en-AU" sz="3600" dirty="0" err="1"/>
+              <a:t>Javascript</a:t>
+            </a:r>
+            <a:r>
+              <a:rPr lang="en-AU" sz="3600" dirty="0"/>
+              <a:t>, </a:t>
+            </a:r>
+            <a:r>
+              <a:rPr lang="en-AU" sz="3600" dirty="0" err="1"/>
+              <a:t>Jqerry</a:t>
+            </a:r>
+            <a:r>
+              <a:rPr lang="en-AU" sz="3600" dirty="0"/>
+              <a:t> and D3</a:t>
+            </a:r>
+          </a:p>
+          <a:p>
+            <a:pPr>
               <a:spcAft>
                 <a:spcPts val="800"/>
               </a:spcAft>
-              <a:buFont typeface="Arial" panose="020B0604020202020204" pitchFamily="34" charset="0"/>
-              <a:buChar char="•"/>
-              <a:tabLst>
-                <a:tab pos="457200" algn="l"/>
-              </a:tabLst>
             </a:pPr>
             <a:r>
-              <a:rPr lang="en-AU" sz="3200" spc="-5" dirty="0">
-                <a:solidFill>
-                  <a:srgbClr val="292929"/>
-                </a:solidFill>
-                <a:latin typeface="+mj-lt"/>
-                <a:cs typeface="Times New Roman" panose="02020603050405020304" pitchFamily="18" charset="0"/>
-              </a:rPr>
-              <a:t>Considered other models such as:</a:t>
+              <a:rPr lang="en-AU" sz="3600" dirty="0"/>
+              <a:t>Matplotlib for graphs</a:t>
+            </a:r>
+          </a:p>
+          <a:p>
+            <a:pPr>
+              <a:spcAft>
+                <a:spcPts val="800"/>
+              </a:spcAft>
+            </a:pPr>
+            <a:r>
+              <a:rPr lang="en-AU" sz="3600" dirty="0"/>
+              <a:t>Trained Models in </a:t>
+            </a:r>
+            <a:r>
+              <a:rPr lang="en-AU" sz="3600" dirty="0" err="1"/>
+              <a:t>jupyter</a:t>
+            </a:r>
+            <a:r>
+              <a:rPr lang="en-AU" sz="3600" dirty="0"/>
+              <a:t> notebook</a:t>
+            </a:r>
+          </a:p>
+          <a:p>
+            <a:pPr>
+              <a:spcAft>
+                <a:spcPts val="800"/>
+              </a:spcAft>
+            </a:pPr>
+            <a:r>
+              <a:rPr lang="en-AU" sz="3600" dirty="0"/>
+              <a:t>Save/load Models with </a:t>
+            </a:r>
+            <a:r>
+              <a:rPr lang="en-AU" sz="3600" dirty="0" err="1"/>
+              <a:t>sklearn</a:t>
+            </a:r>
+            <a:r>
+              <a:rPr lang="en-AU" sz="3600" dirty="0"/>
+              <a:t> and pickle</a:t>
             </a:r>
           </a:p>
           <a:p>
             <a:pPr marL="0" indent="0">
               <a:buNone/>
             </a:pPr>
-            <a:r>
-              <a:rPr lang="en-AU" sz="3200" spc="-5" dirty="0">
-                <a:solidFill>
-                  <a:srgbClr val="292929"/>
-                </a:solidFill>
-                <a:latin typeface="+mj-lt"/>
-                <a:cs typeface="Times New Roman" panose="02020603050405020304" pitchFamily="18" charset="0"/>
-              </a:rPr>
-              <a:t>	Sequential Neural Network</a:t>
-            </a:r>
-          </a:p>
-          <a:p>
-            <a:pPr marL="0" indent="0">
-              <a:buNone/>
-            </a:pPr>
-            <a:r>
-              <a:rPr lang="en-AU" sz="3200" spc="-5" dirty="0">
-                <a:solidFill>
-                  <a:srgbClr val="292929"/>
-                </a:solidFill>
-                <a:latin typeface="+mj-lt"/>
-                <a:cs typeface="Times New Roman" panose="02020603050405020304" pitchFamily="18" charset="0"/>
-              </a:rPr>
-              <a:t>	Hyperparameter tuning with </a:t>
-            </a:r>
-            <a:r>
-              <a:rPr lang="en-AU" sz="3200" spc="-5" dirty="0" err="1">
-                <a:solidFill>
-                  <a:srgbClr val="292929"/>
-                </a:solidFill>
-                <a:latin typeface="+mj-lt"/>
-                <a:cs typeface="Times New Roman" panose="02020603050405020304" pitchFamily="18" charset="0"/>
-              </a:rPr>
-              <a:t>GridsearchCV</a:t>
-            </a:r>
-            <a:endParaRPr lang="en-AU" sz="3200" spc="-5" dirty="0">
-              <a:solidFill>
-                <a:srgbClr val="292929"/>
-              </a:solidFill>
-              <a:latin typeface="+mj-lt"/>
-              <a:cs typeface="Times New Roman" panose="02020603050405020304" pitchFamily="18" charset="0"/>
-            </a:endParaRPr>
+            <a:endParaRPr lang="en-AU" sz="3600" dirty="0"/>
           </a:p>
         </p:txBody>
       </p:sp>
     </p:spTree>
     <p:extLst>
       <p:ext uri="{BB962C8B-B14F-4D97-AF65-F5344CB8AC3E}">
-        <p14:creationId xmlns:p14="http://schemas.microsoft.com/office/powerpoint/2010/main" val="3956008943"/>
+        <p14:creationId xmlns:p14="http://schemas.microsoft.com/office/powerpoint/2010/main" val="917554416"/>
       </p:ext>
     </p:extLst>
   </p:cSld>
   <p:clrMapOvr>
     <a:masterClrMapping/>
   </p:clrMapOvr>
-  <mc:AlternateContent xmlns:mc="http://schemas.openxmlformats.org/markup-compatibility/2006">
-    <mc:Choice xmlns:p159="http://schemas.microsoft.com/office/powerpoint/2015/09/main" Requires="p159">
-      <p:transition xmlns:p14="http://schemas.microsoft.com/office/powerpoint/2010/main" spd="slow" p14:dur="1250">
-        <p159:morph option="byObject"/>
-      </p:transition>
-    </mc:Choice>
-    <mc:Fallback>
-      <p:transition spd="slow">
-        <p:fade/>
-      </p:transition>
-    </mc:Fallback>
-  </mc:AlternateContent>
+  <p:transition spd="slow"/>
 </p:sld>
 </file>
 
 <file path=ppt/slides/slide6.xml><?xml version="1.0" encoding="utf-8"?>
 <p:sld xmlns:a="http://schemas.openxmlformats.org/drawingml/2006/main" xmlns:r="http://schemas.openxmlformats.org/officeDocument/2006/relationships" xmlns:p="http://schemas.openxmlformats.org/presentationml/2006/main">
   <p:cSld>
+    <p:bg>
+      <p:bgPr>
+        <a:solidFill>
+          <a:schemeClr val="bg1"/>
+        </a:solidFill>
+        <a:effectLst/>
+      </p:bgPr>
+    </p:bg>
     <p:spTree>
       <p:nvGrpSpPr>
         <p:cNvPr id="1" name=""/>
@@ -6104,12 +7192,703 @@
           <a:chExt cx="0" cy="0"/>
         </a:xfrm>
       </p:grpSpPr>
+      <p:sp useBgFill="1">
+        <p:nvSpPr>
+          <p:cNvPr id="9" name="Rectangle 8">
+            <a:extLst>
+              <a:ext uri="{FF2B5EF4-FFF2-40B4-BE49-F238E27FC236}">
+                <a16:creationId xmlns:a16="http://schemas.microsoft.com/office/drawing/2014/main" id="{733E0473-C315-42D8-A82A-A2FE49DC67DA}"/>
+              </a:ext>
+              <a:ext uri="{C183D7F6-B498-43B3-948B-1728B52AA6E4}">
+                <adec:decorative xmlns:adec="http://schemas.microsoft.com/office/drawing/2017/decorative" val="1"/>
+              </a:ext>
+            </a:extLst>
+          </p:cNvPr>
+          <p:cNvSpPr>
+            <a:spLocks noGrp="1" noRot="1" noChangeAspect="1" noMove="1" noResize="1" noEditPoints="1" noAdjustHandles="1" noChangeArrowheads="1" noChangeShapeType="1" noTextEdit="1"/>
+          </p:cNvSpPr>
+          <p:nvPr>
+            <p:extLst>
+              <p:ext uri="{386F3935-93C4-4BCD-93E2-E3B085C9AB24}">
+                <p16:designElem xmlns:p16="http://schemas.microsoft.com/office/powerpoint/2015/main" val="1"/>
+              </p:ext>
+            </p:extLst>
+          </p:nvPr>
+        </p:nvSpPr>
+        <p:spPr>
+          <a:xfrm>
+            <a:off x="-1" y="0"/>
+            <a:ext cx="12188952" cy="6858000"/>
+          </a:xfrm>
+          <a:prstGeom prst="rect">
+            <a:avLst/>
+          </a:prstGeom>
+          <a:ln>
+            <a:noFill/>
+          </a:ln>
+        </p:spPr>
+        <p:style>
+          <a:lnRef idx="2">
+            <a:schemeClr val="accent1">
+              <a:shade val="50000"/>
+            </a:schemeClr>
+          </a:lnRef>
+          <a:fillRef idx="1">
+            <a:schemeClr val="accent1"/>
+          </a:fillRef>
+          <a:effectRef idx="0">
+            <a:schemeClr val="accent1"/>
+          </a:effectRef>
+          <a:fontRef idx="minor">
+            <a:schemeClr val="lt1"/>
+          </a:fontRef>
+        </p:style>
+        <p:txBody>
+          <a:bodyPr rtlCol="0" anchor="ctr"/>
+          <a:lstStyle/>
+          <a:p>
+            <a:pPr algn="ctr"/>
+            <a:endParaRPr lang="en-US"/>
+          </a:p>
+        </p:txBody>
+      </p:sp>
       <p:sp>
         <p:nvSpPr>
+          <p:cNvPr id="11" name="Rectangle 10">
+            <a:extLst>
+              <a:ext uri="{FF2B5EF4-FFF2-40B4-BE49-F238E27FC236}">
+                <a16:creationId xmlns:a16="http://schemas.microsoft.com/office/drawing/2014/main" id="{AD23A251-68F2-43E5-812B-4BBAE1AF535E}"/>
+              </a:ext>
+              <a:ext uri="{C183D7F6-B498-43B3-948B-1728B52AA6E4}">
+                <adec:decorative xmlns:adec="http://schemas.microsoft.com/office/drawing/2017/decorative" val="1"/>
+              </a:ext>
+            </a:extLst>
+          </p:cNvPr>
+          <p:cNvSpPr>
+            <a:spLocks noGrp="1" noRot="1" noChangeAspect="1" noMove="1" noResize="1" noEditPoints="1" noAdjustHandles="1" noChangeArrowheads="1" noChangeShapeType="1" noTextEdit="1"/>
+          </p:cNvSpPr>
+          <p:nvPr>
+            <p:extLst>
+              <p:ext uri="{386F3935-93C4-4BCD-93E2-E3B085C9AB24}">
+                <p16:designElem xmlns:p16="http://schemas.microsoft.com/office/powerpoint/2015/main" val="1"/>
+              </p:ext>
+            </p:extLst>
+          </p:nvPr>
+        </p:nvSpPr>
+        <p:spPr>
+          <a:xfrm>
+            <a:off x="1524" y="0"/>
+            <a:ext cx="12188952" cy="6858000"/>
+          </a:xfrm>
+          <a:prstGeom prst="rect">
+            <a:avLst/>
+          </a:prstGeom>
+          <a:solidFill>
+            <a:srgbClr val="000000"/>
+          </a:solidFill>
+          <a:ln>
+            <a:noFill/>
+          </a:ln>
+        </p:spPr>
+        <p:style>
+          <a:lnRef idx="2">
+            <a:schemeClr val="accent1">
+              <a:shade val="50000"/>
+            </a:schemeClr>
+          </a:lnRef>
+          <a:fillRef idx="1">
+            <a:schemeClr val="accent1"/>
+          </a:fillRef>
+          <a:effectRef idx="0">
+            <a:schemeClr val="accent1"/>
+          </a:effectRef>
+          <a:fontRef idx="minor">
+            <a:schemeClr val="lt1"/>
+          </a:fontRef>
+        </p:style>
+        <p:txBody>
+          <a:bodyPr rtlCol="0" anchor="ctr"/>
+          <a:lstStyle/>
+          <a:p>
+            <a:pPr algn="ctr"/>
+            <a:endParaRPr lang="en-US" sz="900">
+              <a:solidFill>
+                <a:schemeClr val="bg1"/>
+              </a:solidFill>
+              <a:latin typeface="+mj-lt"/>
+            </a:endParaRPr>
+          </a:p>
+        </p:txBody>
+      </p:sp>
+      <p:pic>
+        <p:nvPicPr>
+          <p:cNvPr id="4" name="Picture 3" descr="Aerial view of sandy beach and ocean with waves">
+            <a:extLst>
+              <a:ext uri="{FF2B5EF4-FFF2-40B4-BE49-F238E27FC236}">
+                <a16:creationId xmlns:a16="http://schemas.microsoft.com/office/drawing/2014/main" id="{A824D5C8-C167-BDC7-C229-EDBFB8E9BDC8}"/>
+              </a:ext>
+            </a:extLst>
+          </p:cNvPr>
+          <p:cNvPicPr>
+            <a:picLocks noChangeAspect="1"/>
+          </p:cNvPicPr>
+          <p:nvPr/>
+        </p:nvPicPr>
+        <p:blipFill rotWithShape="1">
+          <a:blip r:embed="rId2">
+            <a:alphaModFix amt="40000"/>
+          </a:blip>
+          <a:srcRect r="-1" b="24980"/>
+          <a:stretch/>
+        </p:blipFill>
+        <p:spPr>
+          <a:xfrm>
+            <a:off x="1524" y="10"/>
+            <a:ext cx="12188951" cy="6857990"/>
+          </a:xfrm>
+          <a:prstGeom prst="rect">
+            <a:avLst/>
+          </a:prstGeom>
+        </p:spPr>
+      </p:pic>
+      <p:grpSp>
+        <p:nvGrpSpPr>
+          <p:cNvPr id="13" name="decorative circle">
+            <a:extLst>
+              <a:ext uri="{FF2B5EF4-FFF2-40B4-BE49-F238E27FC236}">
+                <a16:creationId xmlns:a16="http://schemas.microsoft.com/office/drawing/2014/main" id="{0350AF23-2606-421F-AB7B-23D9B48F3E9B}"/>
+              </a:ext>
+              <a:ext uri="{C183D7F6-B498-43B3-948B-1728B52AA6E4}">
+                <adec:decorative xmlns:adec="http://schemas.microsoft.com/office/drawing/2017/decorative" val="1"/>
+              </a:ext>
+            </a:extLst>
+          </p:cNvPr>
+          <p:cNvGrpSpPr>
+            <a:grpSpLocks noGrp="1" noUngrp="1" noRot="1" noChangeAspect="1" noMove="1" noResize="1"/>
+          </p:cNvGrpSpPr>
+          <p:nvPr>
+            <p:extLst>
+              <p:ext uri="{386F3935-93C4-4BCD-93E2-E3B085C9AB24}">
+                <p16:designElem xmlns:p16="http://schemas.microsoft.com/office/powerpoint/2015/main" val="1"/>
+              </p:ext>
+            </p:extLst>
+          </p:nvPr>
+        </p:nvGrpSpPr>
+        <p:grpSpPr>
+          <a:xfrm>
+            <a:off x="314102" y="236341"/>
+            <a:ext cx="11340713" cy="5464029"/>
+            <a:chOff x="314102" y="236341"/>
+            <a:chExt cx="11340713" cy="5464029"/>
+          </a:xfrm>
+        </p:grpSpPr>
+        <p:sp>
+          <p:nvSpPr>
+            <p:cNvPr id="14" name="Oval 13">
+              <a:extLst>
+                <a:ext uri="{FF2B5EF4-FFF2-40B4-BE49-F238E27FC236}">
+                  <a16:creationId xmlns:a16="http://schemas.microsoft.com/office/drawing/2014/main" id="{526A544A-3C76-4502-A741-F4DB0E2CD2FD}"/>
+                </a:ext>
+                <a:ext uri="{C183D7F6-B498-43B3-948B-1728B52AA6E4}">
+                  <adec:decorative xmlns:adec="http://schemas.microsoft.com/office/drawing/2017/decorative" val="1"/>
+                </a:ext>
+              </a:extLst>
+            </p:cNvPr>
+            <p:cNvSpPr/>
+            <p:nvPr>
+              <p:extLst>
+                <p:ext uri="{386F3935-93C4-4BCD-93E2-E3B085C9AB24}">
+                  <p16:designElem xmlns:p16="http://schemas.microsoft.com/office/powerpoint/2015/main" val="1"/>
+                </p:ext>
+              </p:extLst>
+            </p:nvPr>
+          </p:nvSpPr>
+          <p:spPr>
+            <a:xfrm>
+              <a:off x="7760448" y="3803994"/>
+              <a:ext cx="94160" cy="94160"/>
+            </a:xfrm>
+            <a:prstGeom prst="ellipse">
+              <a:avLst/>
+            </a:prstGeom>
+            <a:solidFill>
+              <a:srgbClr val="E3BEBE">
+                <a:alpha val="28000"/>
+              </a:srgbClr>
+            </a:solidFill>
+            <a:ln>
+              <a:noFill/>
+            </a:ln>
+          </p:spPr>
+          <p:style>
+            <a:lnRef idx="2">
+              <a:schemeClr val="accent1">
+                <a:shade val="50000"/>
+              </a:schemeClr>
+            </a:lnRef>
+            <a:fillRef idx="1">
+              <a:schemeClr val="accent1"/>
+            </a:fillRef>
+            <a:effectRef idx="0">
+              <a:schemeClr val="accent1"/>
+            </a:effectRef>
+            <a:fontRef idx="minor">
+              <a:schemeClr val="lt1"/>
+            </a:fontRef>
+          </p:style>
+          <p:txBody>
+            <a:bodyPr rtlCol="0" anchor="ctr"/>
+            <a:lstStyle/>
+            <a:p>
+              <a:pPr algn="ctr"/>
+              <a:endParaRPr lang="en-US"/>
+            </a:p>
+          </p:txBody>
+        </p:sp>
+        <p:sp>
+          <p:nvSpPr>
+            <p:cNvPr id="15" name="Oval 14">
+              <a:extLst>
+                <a:ext uri="{FF2B5EF4-FFF2-40B4-BE49-F238E27FC236}">
+                  <a16:creationId xmlns:a16="http://schemas.microsoft.com/office/drawing/2014/main" id="{017B8593-D171-47B5-8D1A-E34E7B138476}"/>
+                </a:ext>
+                <a:ext uri="{C183D7F6-B498-43B3-948B-1728B52AA6E4}">
+                  <adec:decorative xmlns:adec="http://schemas.microsoft.com/office/drawing/2017/decorative" val="1"/>
+                </a:ext>
+              </a:extLst>
+            </p:cNvPr>
+            <p:cNvSpPr/>
+            <p:nvPr>
+              <p:extLst>
+                <p:ext uri="{386F3935-93C4-4BCD-93E2-E3B085C9AB24}">
+                  <p16:designElem xmlns:p16="http://schemas.microsoft.com/office/powerpoint/2015/main" val="1"/>
+                </p:ext>
+              </p:extLst>
+            </p:nvPr>
+          </p:nvSpPr>
+          <p:spPr>
+            <a:xfrm>
+              <a:off x="314102" y="3044381"/>
+              <a:ext cx="226735" cy="226735"/>
+            </a:xfrm>
+            <a:prstGeom prst="ellipse">
+              <a:avLst/>
+            </a:prstGeom>
+            <a:solidFill>
+              <a:schemeClr val="tx2">
+                <a:lumMod val="50000"/>
+                <a:lumOff val="50000"/>
+              </a:schemeClr>
+            </a:solidFill>
+            <a:ln>
+              <a:noFill/>
+            </a:ln>
+          </p:spPr>
+          <p:style>
+            <a:lnRef idx="2">
+              <a:schemeClr val="accent1">
+                <a:shade val="50000"/>
+              </a:schemeClr>
+            </a:lnRef>
+            <a:fillRef idx="1">
+              <a:schemeClr val="accent1"/>
+            </a:fillRef>
+            <a:effectRef idx="0">
+              <a:schemeClr val="accent1"/>
+            </a:effectRef>
+            <a:fontRef idx="minor">
+              <a:schemeClr val="lt1"/>
+            </a:fontRef>
+          </p:style>
+          <p:txBody>
+            <a:bodyPr rtlCol="0" anchor="ctr"/>
+            <a:lstStyle/>
+            <a:p>
+              <a:pPr algn="ctr"/>
+              <a:endParaRPr lang="en-US"/>
+            </a:p>
+          </p:txBody>
+        </p:sp>
+        <p:sp>
+          <p:nvSpPr>
+            <p:cNvPr id="16" name="Oval 15">
+              <a:extLst>
+                <a:ext uri="{FF2B5EF4-FFF2-40B4-BE49-F238E27FC236}">
+                  <a16:creationId xmlns:a16="http://schemas.microsoft.com/office/drawing/2014/main" id="{1FEF60D4-64F6-450F-B86D-383EEA1C843F}"/>
+                </a:ext>
+                <a:ext uri="{C183D7F6-B498-43B3-948B-1728B52AA6E4}">
+                  <adec:decorative xmlns:adec="http://schemas.microsoft.com/office/drawing/2017/decorative" val="1"/>
+                </a:ext>
+              </a:extLst>
+            </p:cNvPr>
+            <p:cNvSpPr/>
+            <p:nvPr>
+              <p:extLst>
+                <p:ext uri="{386F3935-93C4-4BCD-93E2-E3B085C9AB24}">
+                  <p16:designElem xmlns:p16="http://schemas.microsoft.com/office/powerpoint/2015/main" val="1"/>
+                </p:ext>
+              </p:extLst>
+            </p:nvPr>
+          </p:nvSpPr>
+          <p:spPr>
+            <a:xfrm>
+              <a:off x="11188374" y="386135"/>
+              <a:ext cx="466441" cy="466441"/>
+            </a:xfrm>
+            <a:prstGeom prst="ellipse">
+              <a:avLst/>
+            </a:prstGeom>
+            <a:solidFill>
+              <a:schemeClr val="accent2">
+                <a:lumMod val="60000"/>
+                <a:lumOff val="40000"/>
+                <a:alpha val="72000"/>
+              </a:schemeClr>
+            </a:solidFill>
+            <a:ln>
+              <a:noFill/>
+            </a:ln>
+          </p:spPr>
+          <p:style>
+            <a:lnRef idx="2">
+              <a:schemeClr val="accent1">
+                <a:shade val="50000"/>
+              </a:schemeClr>
+            </a:lnRef>
+            <a:fillRef idx="1">
+              <a:schemeClr val="accent1"/>
+            </a:fillRef>
+            <a:effectRef idx="0">
+              <a:schemeClr val="accent1"/>
+            </a:effectRef>
+            <a:fontRef idx="minor">
+              <a:schemeClr val="lt1"/>
+            </a:fontRef>
+          </p:style>
+          <p:txBody>
+            <a:bodyPr rtlCol="0" anchor="ctr"/>
+            <a:lstStyle/>
+            <a:p>
+              <a:pPr algn="ctr"/>
+              <a:endParaRPr lang="en-US"/>
+            </a:p>
+          </p:txBody>
+        </p:sp>
+        <p:sp>
+          <p:nvSpPr>
+            <p:cNvPr id="17" name="Oval 16">
+              <a:extLst>
+                <a:ext uri="{FF2B5EF4-FFF2-40B4-BE49-F238E27FC236}">
+                  <a16:creationId xmlns:a16="http://schemas.microsoft.com/office/drawing/2014/main" id="{A97D4A7C-B520-46CB-9A94-711F53997BDB}"/>
+                </a:ext>
+                <a:ext uri="{C183D7F6-B498-43B3-948B-1728B52AA6E4}">
+                  <adec:decorative xmlns:adec="http://schemas.microsoft.com/office/drawing/2017/decorative" val="1"/>
+                </a:ext>
+              </a:extLst>
+            </p:cNvPr>
+            <p:cNvSpPr/>
+            <p:nvPr>
+              <p:extLst>
+                <p:ext uri="{386F3935-93C4-4BCD-93E2-E3B085C9AB24}">
+                  <p16:designElem xmlns:p16="http://schemas.microsoft.com/office/powerpoint/2015/main" val="1"/>
+                </p:ext>
+              </p:extLst>
+            </p:nvPr>
+          </p:nvSpPr>
+          <p:spPr>
+            <a:xfrm>
+              <a:off x="11065714" y="236341"/>
+              <a:ext cx="113367" cy="113367"/>
+            </a:xfrm>
+            <a:prstGeom prst="ellipse">
+              <a:avLst/>
+            </a:prstGeom>
+            <a:solidFill>
+              <a:srgbClr val="F39E29"/>
+            </a:solidFill>
+            <a:ln>
+              <a:noFill/>
+            </a:ln>
+          </p:spPr>
+          <p:style>
+            <a:lnRef idx="2">
+              <a:schemeClr val="accent1">
+                <a:shade val="50000"/>
+              </a:schemeClr>
+            </a:lnRef>
+            <a:fillRef idx="1">
+              <a:schemeClr val="accent1"/>
+            </a:fillRef>
+            <a:effectRef idx="0">
+              <a:schemeClr val="accent1"/>
+            </a:effectRef>
+            <a:fontRef idx="minor">
+              <a:schemeClr val="lt1"/>
+            </a:fontRef>
+          </p:style>
+          <p:txBody>
+            <a:bodyPr rtlCol="0" anchor="ctr"/>
+            <a:lstStyle/>
+            <a:p>
+              <a:pPr algn="ctr"/>
+              <a:endParaRPr lang="en-US"/>
+            </a:p>
+          </p:txBody>
+        </p:sp>
+        <p:sp>
+          <p:nvSpPr>
+            <p:cNvPr id="18" name="Oval 17">
+              <a:extLst>
+                <a:ext uri="{FF2B5EF4-FFF2-40B4-BE49-F238E27FC236}">
+                  <a16:creationId xmlns:a16="http://schemas.microsoft.com/office/drawing/2014/main" id="{2B7B976F-E84B-4936-90D7-C8298A5E7BD0}"/>
+                </a:ext>
+                <a:ext uri="{C183D7F6-B498-43B3-948B-1728B52AA6E4}">
+                  <adec:decorative xmlns:adec="http://schemas.microsoft.com/office/drawing/2017/decorative" val="1"/>
+                </a:ext>
+              </a:extLst>
+            </p:cNvPr>
+            <p:cNvSpPr/>
+            <p:nvPr>
+              <p:extLst>
+                <p:ext uri="{386F3935-93C4-4BCD-93E2-E3B085C9AB24}">
+                  <p16:designElem xmlns:p16="http://schemas.microsoft.com/office/powerpoint/2015/main" val="1"/>
+                </p:ext>
+              </p:extLst>
+            </p:nvPr>
+          </p:nvSpPr>
+          <p:spPr>
+            <a:xfrm>
+              <a:off x="751535" y="2516671"/>
+              <a:ext cx="466441" cy="466441"/>
+            </a:xfrm>
+            <a:prstGeom prst="ellipse">
+              <a:avLst/>
+            </a:prstGeom>
+            <a:solidFill>
+              <a:schemeClr val="accent1"/>
+            </a:solidFill>
+            <a:ln>
+              <a:noFill/>
+            </a:ln>
+          </p:spPr>
+          <p:style>
+            <a:lnRef idx="2">
+              <a:schemeClr val="accent1">
+                <a:shade val="50000"/>
+              </a:schemeClr>
+            </a:lnRef>
+            <a:fillRef idx="1">
+              <a:schemeClr val="accent1"/>
+            </a:fillRef>
+            <a:effectRef idx="0">
+              <a:schemeClr val="accent1"/>
+            </a:effectRef>
+            <a:fontRef idx="minor">
+              <a:schemeClr val="lt1"/>
+            </a:fontRef>
+          </p:style>
+          <p:txBody>
+            <a:bodyPr rtlCol="0" anchor="ctr"/>
+            <a:lstStyle/>
+            <a:p>
+              <a:pPr algn="ctr"/>
+              <a:endParaRPr lang="en-US"/>
+            </a:p>
+          </p:txBody>
+        </p:sp>
+        <p:sp>
+          <p:nvSpPr>
+            <p:cNvPr id="19" name="Oval 18">
+              <a:extLst>
+                <a:ext uri="{FF2B5EF4-FFF2-40B4-BE49-F238E27FC236}">
+                  <a16:creationId xmlns:a16="http://schemas.microsoft.com/office/drawing/2014/main" id="{DC91FFEC-59DF-4D22-A925-F5152076924B}"/>
+                </a:ext>
+                <a:ext uri="{C183D7F6-B498-43B3-948B-1728B52AA6E4}">
+                  <adec:decorative xmlns:adec="http://schemas.microsoft.com/office/drawing/2017/decorative" val="1"/>
+                </a:ext>
+              </a:extLst>
+            </p:cNvPr>
+            <p:cNvSpPr/>
+            <p:nvPr>
+              <p:extLst>
+                <p:ext uri="{386F3935-93C4-4BCD-93E2-E3B085C9AB24}">
+                  <p16:designElem xmlns:p16="http://schemas.microsoft.com/office/powerpoint/2015/main" val="1"/>
+                </p:ext>
+              </p:extLst>
+            </p:nvPr>
+          </p:nvSpPr>
+          <p:spPr>
+            <a:xfrm>
+              <a:off x="11230142" y="4588038"/>
+              <a:ext cx="113367" cy="113367"/>
+            </a:xfrm>
+            <a:prstGeom prst="ellipse">
+              <a:avLst/>
+            </a:prstGeom>
+            <a:solidFill>
+              <a:schemeClr val="accent3"/>
+            </a:solidFill>
+            <a:ln>
+              <a:noFill/>
+            </a:ln>
+          </p:spPr>
+          <p:style>
+            <a:lnRef idx="2">
+              <a:schemeClr val="accent1">
+                <a:shade val="50000"/>
+              </a:schemeClr>
+            </a:lnRef>
+            <a:fillRef idx="1">
+              <a:schemeClr val="accent1"/>
+            </a:fillRef>
+            <a:effectRef idx="0">
+              <a:schemeClr val="accent1"/>
+            </a:effectRef>
+            <a:fontRef idx="minor">
+              <a:schemeClr val="lt1"/>
+            </a:fontRef>
+          </p:style>
+          <p:txBody>
+            <a:bodyPr rtlCol="0" anchor="ctr"/>
+            <a:lstStyle/>
+            <a:p>
+              <a:pPr algn="ctr"/>
+              <a:endParaRPr lang="en-US"/>
+            </a:p>
+          </p:txBody>
+        </p:sp>
+        <p:sp>
+          <p:nvSpPr>
+            <p:cNvPr id="20" name="Oval 19">
+              <a:extLst>
+                <a:ext uri="{FF2B5EF4-FFF2-40B4-BE49-F238E27FC236}">
+                  <a16:creationId xmlns:a16="http://schemas.microsoft.com/office/drawing/2014/main" id="{58931E95-0847-47E4-8AEC-312312A03232}"/>
+                </a:ext>
+                <a:ext uri="{C183D7F6-B498-43B3-948B-1728B52AA6E4}">
+                  <adec:decorative xmlns:adec="http://schemas.microsoft.com/office/drawing/2017/decorative" val="1"/>
+                </a:ext>
+              </a:extLst>
+            </p:cNvPr>
+            <p:cNvSpPr/>
+            <p:nvPr>
+              <p:extLst>
+                <p:ext uri="{386F3935-93C4-4BCD-93E2-E3B085C9AB24}">
+                  <p16:designElem xmlns:p16="http://schemas.microsoft.com/office/powerpoint/2015/main" val="1"/>
+                </p:ext>
+              </p:extLst>
+            </p:nvPr>
+          </p:nvSpPr>
+          <p:spPr>
+            <a:xfrm>
+              <a:off x="10902046" y="5394590"/>
+              <a:ext cx="305780" cy="305780"/>
+            </a:xfrm>
+            <a:prstGeom prst="ellipse">
+              <a:avLst/>
+            </a:prstGeom>
+            <a:solidFill>
+              <a:schemeClr val="accent1">
+                <a:lumMod val="40000"/>
+                <a:lumOff val="60000"/>
+              </a:schemeClr>
+            </a:solidFill>
+            <a:ln>
+              <a:noFill/>
+            </a:ln>
+          </p:spPr>
+          <p:style>
+            <a:lnRef idx="2">
+              <a:schemeClr val="accent1">
+                <a:shade val="50000"/>
+              </a:schemeClr>
+            </a:lnRef>
+            <a:fillRef idx="1">
+              <a:schemeClr val="accent1"/>
+            </a:fillRef>
+            <a:effectRef idx="0">
+              <a:schemeClr val="accent1"/>
+            </a:effectRef>
+            <a:fontRef idx="minor">
+              <a:schemeClr val="lt1"/>
+            </a:fontRef>
+          </p:style>
+          <p:txBody>
+            <a:bodyPr rtlCol="0" anchor="ctr"/>
+            <a:lstStyle/>
+            <a:p>
+              <a:pPr algn="ctr"/>
+              <a:endParaRPr lang="en-US"/>
+            </a:p>
+          </p:txBody>
+        </p:sp>
+        <p:sp>
+          <p:nvSpPr>
+            <p:cNvPr id="21" name="Oval 20">
+              <a:extLst>
+                <a:ext uri="{FF2B5EF4-FFF2-40B4-BE49-F238E27FC236}">
+                  <a16:creationId xmlns:a16="http://schemas.microsoft.com/office/drawing/2014/main" id="{3C094915-EF93-49A0-9B90-C44FB9B5007A}"/>
+                </a:ext>
+                <a:ext uri="{C183D7F6-B498-43B3-948B-1728B52AA6E4}">
+                  <adec:decorative xmlns:adec="http://schemas.microsoft.com/office/drawing/2017/decorative" val="1"/>
+                </a:ext>
+              </a:extLst>
+            </p:cNvPr>
+            <p:cNvSpPr/>
+            <p:nvPr>
+              <p:extLst>
+                <p:ext uri="{386F3935-93C4-4BCD-93E2-E3B085C9AB24}">
+                  <p16:designElem xmlns:p16="http://schemas.microsoft.com/office/powerpoint/2015/main" val="1"/>
+                </p:ext>
+              </p:extLst>
+            </p:nvPr>
+          </p:nvSpPr>
+          <p:spPr>
+            <a:xfrm>
+              <a:off x="10408287" y="5160714"/>
+              <a:ext cx="113367" cy="113367"/>
+            </a:xfrm>
+            <a:prstGeom prst="ellipse">
+              <a:avLst/>
+            </a:prstGeom>
+            <a:solidFill>
+              <a:schemeClr val="accent5"/>
+            </a:solidFill>
+            <a:ln>
+              <a:noFill/>
+            </a:ln>
+          </p:spPr>
+          <p:style>
+            <a:lnRef idx="2">
+              <a:schemeClr val="accent1">
+                <a:shade val="50000"/>
+              </a:schemeClr>
+            </a:lnRef>
+            <a:fillRef idx="1">
+              <a:schemeClr val="accent1"/>
+            </a:fillRef>
+            <a:effectRef idx="0">
+              <a:schemeClr val="accent1"/>
+            </a:effectRef>
+            <a:fontRef idx="minor">
+              <a:schemeClr val="lt1"/>
+            </a:fontRef>
+          </p:style>
+          <p:txBody>
+            <a:bodyPr rtlCol="0" anchor="ctr"/>
+            <a:lstStyle/>
+            <a:p>
+              <a:pPr algn="ctr"/>
+              <a:endParaRPr lang="en-US"/>
+            </a:p>
+          </p:txBody>
+        </p:sp>
+      </p:grpSp>
+      <p:sp>
+        <p:nvSpPr>
           <p:cNvPr id="2" name="Title 1">
             <a:extLst>
               <a:ext uri="{FF2B5EF4-FFF2-40B4-BE49-F238E27FC236}">
-                <a16:creationId xmlns:a16="http://schemas.microsoft.com/office/drawing/2014/main" id="{EB9F7006-FA55-0C62-B8C2-01336E2FB8E4}"/>
+                <a16:creationId xmlns:a16="http://schemas.microsoft.com/office/drawing/2014/main" id="{A598DAE5-AFB7-C502-E6E4-36E1FAC0BE64}"/>
               </a:ext>
             </a:extLst>
           </p:cNvPr>
@@ -6117,39 +7896,15 @@
             <a:spLocks noGrp="1"/>
           </p:cNvSpPr>
           <p:nvPr>
-            <p:ph type="title"/>
-          </p:nvPr>
-        </p:nvSpPr>
-        <p:spPr/>
-        <p:txBody>
-          <a:bodyPr/>
-          <a:lstStyle/>
-          <a:p>
-            <a:r>
-              <a:rPr lang="en-AU" dirty="0"/>
-              <a:t>Model Creation</a:t>
-            </a:r>
-            <a:endParaRPr lang="en-AU" sz="5400" dirty="0"/>
-          </a:p>
-        </p:txBody>
-      </p:sp>
-      <p:sp>
-        <p:nvSpPr>
-          <p:cNvPr id="3" name="Content Placeholder 2">
-            <a:extLst>
-              <a:ext uri="{FF2B5EF4-FFF2-40B4-BE49-F238E27FC236}">
-                <a16:creationId xmlns:a16="http://schemas.microsoft.com/office/drawing/2014/main" id="{0D8E844B-D935-5247-65FD-F11288A4ED48}"/>
-              </a:ext>
-            </a:extLst>
-          </p:cNvPr>
-          <p:cNvSpPr>
-            <a:spLocks noGrp="1"/>
-          </p:cNvSpPr>
-          <p:nvPr>
-            <p:ph idx="1"/>
-          </p:nvPr>
-        </p:nvSpPr>
-        <p:spPr/>
+            <p:ph type="ctrTitle"/>
+          </p:nvPr>
+        </p:nvSpPr>
+        <p:spPr>
+          <a:xfrm>
+            <a:off x="2562606" y="1122363"/>
+            <a:ext cx="7063739" cy="2387600"/>
+          </a:xfrm>
+        </p:spPr>
         <p:txBody>
           <a:bodyPr>
             <a:normAutofit/>
@@ -6157,64 +7912,70 @@
           <a:lstStyle/>
           <a:p>
             <a:r>
-              <a:rPr lang="en-AU" sz="3600" dirty="0" err="1"/>
-              <a:t>Preprocessing</a:t>
-            </a:r>
-            <a:endParaRPr lang="en-AU" sz="3600" dirty="0"/>
-          </a:p>
-          <a:p>
-            <a:r>
-              <a:rPr lang="en-AU" sz="3600" dirty="0"/>
-              <a:t>Split into Training and Testing data</a:t>
-            </a:r>
-          </a:p>
-          <a:p>
-            <a:r>
-              <a:rPr lang="en-AU" sz="3600" dirty="0"/>
-              <a:t>Tested Predictions</a:t>
-            </a:r>
-          </a:p>
-          <a:p>
-            <a:pPr>
-              <a:spcAft>
-                <a:spcPts val="800"/>
-              </a:spcAft>
-            </a:pPr>
-            <a:r>
-              <a:rPr lang="en-AU" sz="3600" dirty="0"/>
-              <a:t>Plotted the data between testing and training</a:t>
-            </a:r>
-          </a:p>
-          <a:p>
-            <a:pPr>
-              <a:spcAft>
-                <a:spcPts val="800"/>
-              </a:spcAft>
-            </a:pPr>
-            <a:r>
-              <a:rPr lang="en-AU" sz="3600" dirty="0"/>
-              <a:t>Saved the Model </a:t>
-            </a:r>
-          </a:p>
-          <a:p>
-            <a:pPr marL="0" indent="0">
-              <a:buNone/>
-            </a:pPr>
-            <a:endParaRPr lang="en-AU" sz="3600" dirty="0"/>
+              <a:rPr lang="en-AU" dirty="0">
+                <a:solidFill>
+                  <a:srgbClr val="FFFFFF"/>
+                </a:solidFill>
+              </a:rPr>
+              <a:t>DEMONSTRATION</a:t>
+            </a:r>
+          </a:p>
+        </p:txBody>
+      </p:sp>
+      <p:sp>
+        <p:nvSpPr>
+          <p:cNvPr id="3" name="Subtitle 2">
+            <a:extLst>
+              <a:ext uri="{FF2B5EF4-FFF2-40B4-BE49-F238E27FC236}">
+                <a16:creationId xmlns:a16="http://schemas.microsoft.com/office/drawing/2014/main" id="{0ED3846D-A3E6-D02C-B627-A5CB2CA7753F}"/>
+              </a:ext>
+            </a:extLst>
+          </p:cNvPr>
+          <p:cNvSpPr>
+            <a:spLocks noGrp="1"/>
+          </p:cNvSpPr>
+          <p:nvPr>
+            <p:ph type="subTitle" idx="1"/>
+          </p:nvPr>
+        </p:nvSpPr>
+        <p:spPr>
+          <a:xfrm>
+            <a:off x="2562606" y="3602038"/>
+            <a:ext cx="7063739" cy="1655762"/>
+          </a:xfrm>
+        </p:spPr>
+        <p:txBody>
+          <a:bodyPr>
+            <a:normAutofit/>
+          </a:bodyPr>
+          <a:lstStyle/>
+          <a:p>
+            <a:endParaRPr lang="en-AU" dirty="0">
+              <a:solidFill>
+                <a:srgbClr val="FFFFFF"/>
+              </a:solidFill>
+            </a:endParaRPr>
           </a:p>
         </p:txBody>
       </p:sp>
     </p:spTree>
     <p:extLst>
       <p:ext uri="{BB962C8B-B14F-4D97-AF65-F5344CB8AC3E}">
-        <p14:creationId xmlns:p14="http://schemas.microsoft.com/office/powerpoint/2010/main" val="917554416"/>
+        <p14:creationId xmlns:p14="http://schemas.microsoft.com/office/powerpoint/2010/main" val="2079915892"/>
       </p:ext>
     </p:extLst>
   </p:cSld>
   <p:clrMapOvr>
     <a:masterClrMapping/>
   </p:clrMapOvr>
-  <p:transition spd="slow"/>
+  <mc:AlternateContent xmlns:mc="http://schemas.openxmlformats.org/markup-compatibility/2006">
+    <mc:Choice xmlns:p14="http://schemas.microsoft.com/office/powerpoint/2010/main" Requires="p14">
+      <p:transition p14:dur="250"/>
+    </mc:Choice>
+    <mc:Fallback>
+      <p:transition/>
+    </mc:Fallback>
+  </mc:AlternateContent>
 </p:sld>
 </file>
 
@@ -6240,7 +8001,7 @@
           <p:cNvPr id="2" name="Title 1">
             <a:extLst>
               <a:ext uri="{FF2B5EF4-FFF2-40B4-BE49-F238E27FC236}">
-                <a16:creationId xmlns:a16="http://schemas.microsoft.com/office/drawing/2014/main" id="{3387D18C-3AB6-61F8-F6C9-ABC43A17C65F}"/>
+                <a16:creationId xmlns:a16="http://schemas.microsoft.com/office/drawing/2014/main" id="{077790A3-3FEB-A2C9-9372-1AC31B1B7D4E}"/>
               </a:ext>
             </a:extLst>
           </p:cNvPr>
@@ -6258,7 +8019,7 @@
           <a:p>
             <a:r>
               <a:rPr lang="en-AU" dirty="0"/>
-              <a:t>DEMO</a:t>
+              <a:t>Further features</a:t>
             </a:r>
           </a:p>
         </p:txBody>
@@ -6268,7 +8029,7 @@
           <p:cNvPr id="3" name="Content Placeholder 2">
             <a:extLst>
               <a:ext uri="{FF2B5EF4-FFF2-40B4-BE49-F238E27FC236}">
-                <a16:creationId xmlns:a16="http://schemas.microsoft.com/office/drawing/2014/main" id="{82648CEC-0D42-FC68-DB4E-B083D8B86258}"/>
+                <a16:creationId xmlns:a16="http://schemas.microsoft.com/office/drawing/2014/main" id="{4AF40708-192D-7BD1-4BEE-6890F25405FC}"/>
               </a:ext>
             </a:extLst>
           </p:cNvPr>
@@ -6284,89 +8045,6 @@
           <a:bodyPr/>
           <a:lstStyle/>
           <a:p>
-            <a:endParaRPr lang="en-AU"/>
-          </a:p>
-        </p:txBody>
-      </p:sp>
-    </p:spTree>
-    <p:extLst>
-      <p:ext uri="{BB962C8B-B14F-4D97-AF65-F5344CB8AC3E}">
-        <p14:creationId xmlns:p14="http://schemas.microsoft.com/office/powerpoint/2010/main" val="3888546286"/>
-      </p:ext>
-    </p:extLst>
-  </p:cSld>
-  <p:clrMapOvr>
-    <a:masterClrMapping/>
-  </p:clrMapOvr>
-</p:sld>
-</file>
-
-<file path=ppt/slides/slide8.xml><?xml version="1.0" encoding="utf-8"?>
-<p:sld xmlns:a="http://schemas.openxmlformats.org/drawingml/2006/main" xmlns:r="http://schemas.openxmlformats.org/officeDocument/2006/relationships" xmlns:p="http://schemas.openxmlformats.org/presentationml/2006/main">
-  <p:cSld>
-    <p:spTree>
-      <p:nvGrpSpPr>
-        <p:cNvPr id="1" name=""/>
-        <p:cNvGrpSpPr/>
-        <p:nvPr/>
-      </p:nvGrpSpPr>
-      <p:grpSpPr>
-        <a:xfrm>
-          <a:off x="0" y="0"/>
-          <a:ext cx="0" cy="0"/>
-          <a:chOff x="0" y="0"/>
-          <a:chExt cx="0" cy="0"/>
-        </a:xfrm>
-      </p:grpSpPr>
-      <p:sp>
-        <p:nvSpPr>
-          <p:cNvPr id="2" name="Title 1">
-            <a:extLst>
-              <a:ext uri="{FF2B5EF4-FFF2-40B4-BE49-F238E27FC236}">
-                <a16:creationId xmlns:a16="http://schemas.microsoft.com/office/drawing/2014/main" id="{077790A3-3FEB-A2C9-9372-1AC31B1B7D4E}"/>
-              </a:ext>
-            </a:extLst>
-          </p:cNvPr>
-          <p:cNvSpPr>
-            <a:spLocks noGrp="1"/>
-          </p:cNvSpPr>
-          <p:nvPr>
-            <p:ph type="title"/>
-          </p:nvPr>
-        </p:nvSpPr>
-        <p:spPr/>
-        <p:txBody>
-          <a:bodyPr/>
-          <a:lstStyle/>
-          <a:p>
-            <a:r>
-              <a:rPr lang="en-AU" dirty="0"/>
-              <a:t>Further features</a:t>
-            </a:r>
-          </a:p>
-        </p:txBody>
-      </p:sp>
-      <p:sp>
-        <p:nvSpPr>
-          <p:cNvPr id="3" name="Content Placeholder 2">
-            <a:extLst>
-              <a:ext uri="{FF2B5EF4-FFF2-40B4-BE49-F238E27FC236}">
-                <a16:creationId xmlns:a16="http://schemas.microsoft.com/office/drawing/2014/main" id="{4AF40708-192D-7BD1-4BEE-6890F25405FC}"/>
-              </a:ext>
-            </a:extLst>
-          </p:cNvPr>
-          <p:cNvSpPr>
-            <a:spLocks noGrp="1"/>
-          </p:cNvSpPr>
-          <p:nvPr>
-            <p:ph idx="1"/>
-          </p:nvPr>
-        </p:nvSpPr>
-        <p:spPr/>
-        <p:txBody>
-          <a:bodyPr/>
-          <a:lstStyle/>
-          <a:p>
             <a:r>
               <a:rPr lang="en-AU" sz="4000" dirty="0"/>
               <a:t>Add more companies to Website</a:t>
@@ -6381,15 +8059,7 @@
           <a:p>
             <a:r>
               <a:rPr lang="en-AU" sz="4000" dirty="0"/>
-              <a:t>Using </a:t>
-            </a:r>
-            <a:r>
-              <a:rPr lang="en-AU" sz="4000" dirty="0" err="1"/>
-              <a:t>MongoDb</a:t>
-            </a:r>
-            <a:r>
-              <a:rPr lang="en-AU" sz="4000" dirty="0"/>
-              <a:t> to scrape data</a:t>
+              <a:t> Scrape data</a:t>
             </a:r>
           </a:p>
           <a:p>
@@ -6401,7 +8071,7 @@
           <a:p>
             <a:r>
               <a:rPr lang="en-AU" sz="4000" dirty="0"/>
-              <a:t>QUESTIONS</a:t>
+              <a:t>QUESTIONS?</a:t>
             </a:r>
           </a:p>
           <a:p>

</xml_diff>

<commit_message>
changed last 60 days to mongodb
</commit_message>
<xml_diff>
--- a/MACHINE LEARNING.pptx
+++ b/MACHINE LEARNING.pptx
@@ -267,7 +267,7 @@
           <a:p>
             <a:fld id="{C43A76A3-ADC8-4477-8FC1-B9DD55D84908}" type="datetime1">
               <a:rPr lang="en-US" smtClean="0"/>
-              <a:t>6/28/2022</a:t>
+              <a:t>6/29/2022</a:t>
             </a:fld>
             <a:endParaRPr lang="en-US" dirty="0"/>
           </a:p>
@@ -337,6 +337,14 @@
   <p:clrMapOvr>
     <a:masterClrMapping/>
   </p:clrMapOvr>
+  <mc:AlternateContent xmlns:mc="http://schemas.openxmlformats.org/markup-compatibility/2006">
+    <mc:Choice xmlns:p14="http://schemas.microsoft.com/office/powerpoint/2010/main" Requires="p14">
+      <p:transition p14:dur="10"/>
+    </mc:Choice>
+    <mc:Fallback>
+      <p:transition/>
+    </mc:Fallback>
+  </mc:AlternateContent>
 </p:sldLayout>
 </file>
 
@@ -465,7 +473,7 @@
           <a:p>
             <a:fld id="{D6762538-DC4D-4667-96E5-B3278DDF8B12}" type="datetime1">
               <a:rPr lang="en-US" smtClean="0"/>
-              <a:t>6/28/2022</a:t>
+              <a:t>6/29/2022</a:t>
             </a:fld>
             <a:endParaRPr lang="en-US"/>
           </a:p>
@@ -535,6 +543,14 @@
   <p:clrMapOvr>
     <a:masterClrMapping/>
   </p:clrMapOvr>
+  <mc:AlternateContent xmlns:mc="http://schemas.openxmlformats.org/markup-compatibility/2006">
+    <mc:Choice xmlns:p14="http://schemas.microsoft.com/office/powerpoint/2010/main" Requires="p14">
+      <p:transition p14:dur="10"/>
+    </mc:Choice>
+    <mc:Fallback>
+      <p:transition/>
+    </mc:Fallback>
+  </mc:AlternateContent>
 </p:sldLayout>
 </file>
 
@@ -673,7 +689,7 @@
           <a:p>
             <a:fld id="{05880548-5C08-4BE3-B63E-F2BB63B0B00C}" type="datetime1">
               <a:rPr lang="en-US" smtClean="0"/>
-              <a:t>6/28/2022</a:t>
+              <a:t>6/29/2022</a:t>
             </a:fld>
             <a:endParaRPr lang="en-US"/>
           </a:p>
@@ -743,6 +759,14 @@
   <p:clrMapOvr>
     <a:masterClrMapping/>
   </p:clrMapOvr>
+  <mc:AlternateContent xmlns:mc="http://schemas.openxmlformats.org/markup-compatibility/2006">
+    <mc:Choice xmlns:p14="http://schemas.microsoft.com/office/powerpoint/2010/main" Requires="p14">
+      <p:transition p14:dur="10"/>
+    </mc:Choice>
+    <mc:Fallback>
+      <p:transition/>
+    </mc:Fallback>
+  </mc:AlternateContent>
 </p:sldLayout>
 </file>
 
@@ -871,7 +895,7 @@
           <a:p>
             <a:fld id="{DE7F49BE-398D-479A-8A7E-5DDBCA61EDCB}" type="datetime1">
               <a:rPr lang="en-US" smtClean="0"/>
-              <a:t>6/28/2022</a:t>
+              <a:t>6/29/2022</a:t>
             </a:fld>
             <a:endParaRPr lang="en-US"/>
           </a:p>
@@ -941,6 +965,14 @@
   <p:clrMapOvr>
     <a:masterClrMapping/>
   </p:clrMapOvr>
+  <mc:AlternateContent xmlns:mc="http://schemas.openxmlformats.org/markup-compatibility/2006">
+    <mc:Choice xmlns:p14="http://schemas.microsoft.com/office/powerpoint/2010/main" Requires="p14">
+      <p:transition p14:dur="10"/>
+    </mc:Choice>
+    <mc:Fallback>
+      <p:transition/>
+    </mc:Fallback>
+  </mc:AlternateContent>
 </p:sldLayout>
 </file>
 
@@ -1147,7 +1179,7 @@
           <a:p>
             <a:fld id="{CCD0C193-4974-4A1F-9C63-07D595E30D66}" type="datetime1">
               <a:rPr lang="en-US" smtClean="0"/>
-              <a:t>6/28/2022</a:t>
+              <a:t>6/29/2022</a:t>
             </a:fld>
             <a:endParaRPr lang="en-US"/>
           </a:p>
@@ -1217,6 +1249,14 @@
   <p:clrMapOvr>
     <a:masterClrMapping/>
   </p:clrMapOvr>
+  <mc:AlternateContent xmlns:mc="http://schemas.openxmlformats.org/markup-compatibility/2006">
+    <mc:Choice xmlns:p14="http://schemas.microsoft.com/office/powerpoint/2010/main" Requires="p14">
+      <p:transition p14:dur="10"/>
+    </mc:Choice>
+    <mc:Fallback>
+      <p:transition/>
+    </mc:Fallback>
+  </mc:AlternateContent>
 </p:sldLayout>
 </file>
 
@@ -1414,7 +1454,7 @@
           <a:p>
             <a:fld id="{701AA87F-28D4-4BF0-B81F-877A89DFD5AC}" type="datetime1">
               <a:rPr lang="en-US" smtClean="0"/>
-              <a:t>6/28/2022</a:t>
+              <a:t>6/29/2022</a:t>
             </a:fld>
             <a:endParaRPr lang="en-US"/>
           </a:p>
@@ -1484,6 +1524,14 @@
   <p:clrMapOvr>
     <a:masterClrMapping/>
   </p:clrMapOvr>
+  <mc:AlternateContent xmlns:mc="http://schemas.openxmlformats.org/markup-compatibility/2006">
+    <mc:Choice xmlns:p14="http://schemas.microsoft.com/office/powerpoint/2010/main" Requires="p14">
+      <p:transition p14:dur="10"/>
+    </mc:Choice>
+    <mc:Fallback>
+      <p:transition/>
+    </mc:Fallback>
+  </mc:AlternateContent>
 </p:sldLayout>
 </file>
 
@@ -1828,7 +1876,7 @@
           <a:p>
             <a:fld id="{A8A9F1F3-208B-49A3-B337-9C8ACEB3E0E1}" type="datetime1">
               <a:rPr lang="en-US" smtClean="0"/>
-              <a:t>6/28/2022</a:t>
+              <a:t>6/29/2022</a:t>
             </a:fld>
             <a:endParaRPr lang="en-US"/>
           </a:p>
@@ -1898,6 +1946,14 @@
   <p:clrMapOvr>
     <a:masterClrMapping/>
   </p:clrMapOvr>
+  <mc:AlternateContent xmlns:mc="http://schemas.openxmlformats.org/markup-compatibility/2006">
+    <mc:Choice xmlns:p14="http://schemas.microsoft.com/office/powerpoint/2010/main" Requires="p14">
+      <p:transition p14:dur="10"/>
+    </mc:Choice>
+    <mc:Fallback>
+      <p:transition/>
+    </mc:Fallback>
+  </mc:AlternateContent>
 </p:sldLayout>
 </file>
 
@@ -1975,7 +2031,7 @@
           <a:p>
             <a:fld id="{27AF6CA6-7293-4AA2-A0E0-A3BF4416E786}" type="datetime1">
               <a:rPr lang="en-US" smtClean="0"/>
-              <a:t>6/28/2022</a:t>
+              <a:t>6/29/2022</a:t>
             </a:fld>
             <a:endParaRPr lang="en-US"/>
           </a:p>
@@ -2045,6 +2101,14 @@
   <p:clrMapOvr>
     <a:masterClrMapping/>
   </p:clrMapOvr>
+  <mc:AlternateContent xmlns:mc="http://schemas.openxmlformats.org/markup-compatibility/2006">
+    <mc:Choice xmlns:p14="http://schemas.microsoft.com/office/powerpoint/2010/main" Requires="p14">
+      <p:transition p14:dur="10"/>
+    </mc:Choice>
+    <mc:Fallback>
+      <p:transition/>
+    </mc:Fallback>
+  </mc:AlternateContent>
 </p:sldLayout>
 </file>
 
@@ -2088,7 +2152,7 @@
           <a:p>
             <a:fld id="{98D87016-7BCD-46FB-8EE3-AB6C369108B4}" type="datetime1">
               <a:rPr lang="en-US" smtClean="0"/>
-              <a:t>6/28/2022</a:t>
+              <a:t>6/29/2022</a:t>
             </a:fld>
             <a:endParaRPr lang="en-US"/>
           </a:p>
@@ -2158,6 +2222,14 @@
   <p:clrMapOvr>
     <a:masterClrMapping/>
   </p:clrMapOvr>
+  <mc:AlternateContent xmlns:mc="http://schemas.openxmlformats.org/markup-compatibility/2006">
+    <mc:Choice xmlns:p14="http://schemas.microsoft.com/office/powerpoint/2010/main" Requires="p14">
+      <p:transition p14:dur="10"/>
+    </mc:Choice>
+    <mc:Fallback>
+      <p:transition/>
+    </mc:Fallback>
+  </mc:AlternateContent>
 </p:sldLayout>
 </file>
 
@@ -2407,7 +2479,7 @@
           <a:p>
             <a:fld id="{A1547011-1FFC-4EF8-9A2E-53B4AD2ADBD4}" type="datetime1">
               <a:rPr lang="en-US" smtClean="0"/>
-              <a:t>6/28/2022</a:t>
+              <a:t>6/29/2022</a:t>
             </a:fld>
             <a:endParaRPr lang="en-US"/>
           </a:p>
@@ -2477,6 +2549,14 @@
   <p:clrMapOvr>
     <a:masterClrMapping/>
   </p:clrMapOvr>
+  <mc:AlternateContent xmlns:mc="http://schemas.openxmlformats.org/markup-compatibility/2006">
+    <mc:Choice xmlns:p14="http://schemas.microsoft.com/office/powerpoint/2010/main" Requires="p14">
+      <p:transition p14:dur="10"/>
+    </mc:Choice>
+    <mc:Fallback>
+      <p:transition/>
+    </mc:Fallback>
+  </mc:AlternateContent>
 </p:sldLayout>
 </file>
 
@@ -2702,7 +2782,7 @@
           <a:p>
             <a:fld id="{9562EB47-45B4-4EF5-A743-B4885DD2F060}" type="datetime1">
               <a:rPr lang="en-US" smtClean="0"/>
-              <a:t>6/28/2022</a:t>
+              <a:t>6/29/2022</a:t>
             </a:fld>
             <a:endParaRPr lang="en-US"/>
           </a:p>
@@ -2772,6 +2852,14 @@
   <p:clrMapOvr>
     <a:masterClrMapping/>
   </p:clrMapOvr>
+  <mc:AlternateContent xmlns:mc="http://schemas.openxmlformats.org/markup-compatibility/2006">
+    <mc:Choice xmlns:p14="http://schemas.microsoft.com/office/powerpoint/2010/main" Requires="p14">
+      <p:transition p14:dur="10"/>
+    </mc:Choice>
+    <mc:Fallback>
+      <p:transition/>
+    </mc:Fallback>
+  </mc:AlternateContent>
 </p:sldLayout>
 </file>
 
@@ -4087,7 +4175,7 @@
           <a:p>
             <a:fld id="{4A8D24A4-5FEC-4062-8995-EB21925B3B40}" type="datetime1">
               <a:rPr lang="en-US" smtClean="0"/>
-              <a:t>6/28/2022</a:t>
+              <a:t>6/29/2022</a:t>
             </a:fld>
             <a:endParaRPr lang="en-US" sz="1000" dirty="0"/>
           </a:p>
@@ -4311,6 +4399,14 @@
     <p:sldLayoutId id="2147483671" r:id="rId10"/>
     <p:sldLayoutId id="2147483672" r:id="rId11"/>
   </p:sldLayoutIdLst>
+  <mc:AlternateContent xmlns:mc="http://schemas.openxmlformats.org/markup-compatibility/2006">
+    <mc:Choice xmlns:p14="http://schemas.microsoft.com/office/powerpoint/2010/main" Requires="p14">
+      <p:transition p14:dur="10"/>
+    </mc:Choice>
+    <mc:Fallback>
+      <p:transition/>
+    </mc:Fallback>
+  </mc:AlternateContent>
   <p:hf sldNum="0" hdr="0" ftr="0" dt="0"/>
   <p:txStyles>
     <p:titleStyle>
@@ -5454,11 +5550,11 @@
   <p:clrMapOvr>
     <a:masterClrMapping/>
   </p:clrMapOvr>
-  <mc:AlternateContent xmlns:mc="http://schemas.openxmlformats.org/markup-compatibility/2006" xmlns:p14="http://schemas.microsoft.com/office/powerpoint/2010/main">
-    <mc:Choice Requires="p14">
-      <p:transition p14:dur="250"/>
+  <mc:AlternateContent xmlns:mc="http://schemas.openxmlformats.org/markup-compatibility/2006">
+    <mc:Choice xmlns:p14="http://schemas.microsoft.com/office/powerpoint/2010/main" Requires="p14">
+      <p:transition p14:dur="10"/>
     </mc:Choice>
-    <mc:Fallback xmlns="">
+    <mc:Fallback>
       <p:transition/>
     </mc:Fallback>
   </mc:AlternateContent>
@@ -5717,15 +5813,6 @@
               </a:rPr>
             </a:br>
             <a:r>
-              <a:rPr lang="en-AU" sz="5400" b="1" dirty="0">
-                <a:effectLst/>
-                <a:latin typeface="Calibri" panose="020F0502020204030204" pitchFamily="34" charset="0"/>
-                <a:ea typeface="Calibri" panose="020F0502020204030204" pitchFamily="34" charset="0"/>
-                <a:cs typeface="Times New Roman" panose="02020603050405020304" pitchFamily="18" charset="0"/>
-              </a:rPr>
-              <a:t>Title: </a:t>
-            </a:r>
-            <a:r>
               <a:rPr lang="en-AU" sz="5400" dirty="0">
                 <a:effectLst/>
                 <a:latin typeface="Calibri" panose="020F0502020204030204" pitchFamily="34" charset="0"/>
@@ -5765,7 +5852,7 @@
         <p:spPr/>
         <p:txBody>
           <a:bodyPr>
-            <a:normAutofit/>
+            <a:normAutofit lnSpcReduction="10000"/>
           </a:bodyPr>
           <a:lstStyle/>
           <a:p>
@@ -5782,47 +5869,6 @@
                 <a:latin typeface="Calibri" panose="020F0502020204030204" pitchFamily="34" charset="0"/>
                 <a:cs typeface="Times New Roman" panose="02020603050405020304" pitchFamily="18" charset="0"/>
               </a:rPr>
-              <a:t>Dataset: </a:t>
-            </a:r>
-            <a:r>
-              <a:rPr lang="en-AU" sz="2800" dirty="0">
-                <a:solidFill>
-                  <a:srgbClr val="292929"/>
-                </a:solidFill>
-                <a:latin typeface="+mj-lt"/>
-              </a:rPr>
-              <a:t>Yahoo Finance history downloads in CSV format saved to </a:t>
-            </a:r>
-            <a:r>
-              <a:rPr lang="en-AU" sz="2800" dirty="0" err="1">
-                <a:solidFill>
-                  <a:srgbClr val="292929"/>
-                </a:solidFill>
-                <a:latin typeface="+mj-lt"/>
-              </a:rPr>
-              <a:t>MongoDb</a:t>
-            </a:r>
-            <a:endParaRPr lang="en-AU" sz="2800" dirty="0">
-              <a:solidFill>
-                <a:srgbClr val="292929"/>
-              </a:solidFill>
-              <a:latin typeface="+mj-lt"/>
-            </a:endParaRPr>
-          </a:p>
-          <a:p>
-            <a:pPr>
-              <a:lnSpc>
-                <a:spcPct val="107000"/>
-              </a:lnSpc>
-              <a:spcAft>
-                <a:spcPts val="800"/>
-              </a:spcAft>
-            </a:pPr>
-            <a:r>
-              <a:rPr lang="en-AU" sz="4300" b="1" dirty="0">
-                <a:latin typeface="Calibri" panose="020F0502020204030204" pitchFamily="34" charset="0"/>
-                <a:cs typeface="Times New Roman" panose="02020603050405020304" pitchFamily="18" charset="0"/>
-              </a:rPr>
               <a:t>Companies: </a:t>
             </a:r>
           </a:p>
@@ -5865,6 +5911,57 @@
             </a:r>
           </a:p>
           <a:p>
+            <a:pPr>
+              <a:lnSpc>
+                <a:spcPct val="117000"/>
+              </a:lnSpc>
+              <a:spcAft>
+                <a:spcPts val="800"/>
+              </a:spcAft>
+            </a:pPr>
+            <a:r>
+              <a:rPr lang="en-AU" sz="4500" b="1" dirty="0">
+                <a:latin typeface="Calibri" panose="020F0502020204030204" pitchFamily="34" charset="0"/>
+                <a:cs typeface="Times New Roman" panose="02020603050405020304" pitchFamily="18" charset="0"/>
+              </a:rPr>
+              <a:t>Dataset: </a:t>
+            </a:r>
+          </a:p>
+          <a:p>
+            <a:pPr lvl="1">
+              <a:lnSpc>
+                <a:spcPct val="117000"/>
+              </a:lnSpc>
+              <a:spcAft>
+                <a:spcPts val="800"/>
+              </a:spcAft>
+            </a:pPr>
+            <a:r>
+              <a:rPr lang="en-AU" sz="2800" dirty="0">
+                <a:solidFill>
+                  <a:srgbClr val="292929"/>
+                </a:solidFill>
+                <a:latin typeface="+mj-lt"/>
+              </a:rPr>
+              <a:t>Yahoo Finance and saved to </a:t>
+            </a:r>
+            <a:r>
+              <a:rPr lang="en-AU" sz="2800" dirty="0" err="1">
+                <a:solidFill>
+                  <a:srgbClr val="292929"/>
+                </a:solidFill>
+                <a:latin typeface="+mj-lt"/>
+              </a:rPr>
+              <a:t>MongoDb</a:t>
+            </a:r>
+            <a:endParaRPr lang="en-AU" sz="2600" dirty="0">
+              <a:solidFill>
+                <a:srgbClr val="292929"/>
+              </a:solidFill>
+              <a:latin typeface="+mj-lt"/>
+            </a:endParaRPr>
+          </a:p>
+          <a:p>
             <a:pPr lvl="1">
               <a:lnSpc>
                 <a:spcPct val="107000"/>
@@ -5880,7 +5977,7 @@
                 </a:solidFill>
                 <a:latin typeface="+mj-lt"/>
               </a:rPr>
-              <a:t>Trained models on 20 years past price fluctuations/behaviour</a:t>
+              <a:t>Trained models on 20 years</a:t>
             </a:r>
           </a:p>
           <a:p>
@@ -5926,7 +6023,14 @@
   <p:clrMapOvr>
     <a:masterClrMapping/>
   </p:clrMapOvr>
-  <p:transition spd="slow"/>
+  <mc:AlternateContent xmlns:mc="http://schemas.openxmlformats.org/markup-compatibility/2006">
+    <mc:Choice xmlns:p14="http://schemas.microsoft.com/office/powerpoint/2010/main" Requires="p14">
+      <p:transition p14:dur="10"/>
+    </mc:Choice>
+    <mc:Fallback>
+      <p:transition/>
+    </mc:Fallback>
+  </mc:AlternateContent>
 </p:sld>
 </file>
 
@@ -6743,7 +6847,7 @@
   </p:clrMapOvr>
   <mc:AlternateContent xmlns:mc="http://schemas.openxmlformats.org/markup-compatibility/2006">
     <mc:Choice xmlns:p14="http://schemas.microsoft.com/office/powerpoint/2010/main" Requires="p14">
-      <p:transition p14:dur="250"/>
+      <p:transition p14:dur="10"/>
     </mc:Choice>
     <mc:Fallback>
       <p:transition/>
@@ -6817,7 +6921,12 @@
             <p:ph idx="1"/>
           </p:nvPr>
         </p:nvSpPr>
-        <p:spPr/>
+        <p:spPr>
+          <a:xfrm>
+            <a:off x="777240" y="1825625"/>
+            <a:ext cx="10659110" cy="4351338"/>
+          </a:xfrm>
+        </p:spPr>
         <p:txBody>
           <a:bodyPr>
             <a:normAutofit/>
@@ -6983,16 +7092,12 @@
   <p:clrMapOvr>
     <a:masterClrMapping/>
   </p:clrMapOvr>
-  <mc:AlternateContent xmlns:mc="http://schemas.openxmlformats.org/markup-compatibility/2006" xmlns:p159="http://schemas.microsoft.com/office/powerpoint/2015/09/main">
-    <mc:Choice Requires="p159">
-      <p:transition xmlns:p14="http://schemas.microsoft.com/office/powerpoint/2010/main" spd="slow" p14:dur="1250">
-        <p159:morph option="byObject"/>
-      </p:transition>
+  <mc:AlternateContent xmlns:mc="http://schemas.openxmlformats.org/markup-compatibility/2006">
+    <mc:Choice xmlns:p14="http://schemas.microsoft.com/office/powerpoint/2010/main" Requires="p14">
+      <p:transition p14:dur="10"/>
     </mc:Choice>
-    <mc:Fallback xmlns="">
-      <p:transition spd="slow">
-        <p:fade/>
-      </p:transition>
+    <mc:Fallback>
+      <p:transition/>
     </mc:Fallback>
   </mc:AlternateContent>
 </p:sld>
@@ -7074,26 +7179,30 @@
           </a:p>
           <a:p>
             <a:r>
+              <a:rPr lang="en-AU" sz="3600" dirty="0" err="1"/>
+              <a:t>Javascript</a:t>
+            </a:r>
+            <a:r>
+              <a:rPr lang="en-AU" sz="3600" dirty="0"/>
+              <a:t>, </a:t>
+            </a:r>
+            <a:r>
+              <a:rPr lang="en-AU" sz="3600" dirty="0" err="1"/>
+              <a:t>jquery</a:t>
+            </a:r>
+            <a:r>
+              <a:rPr lang="en-AU" sz="3600"/>
+              <a:t> </a:t>
+            </a:r>
+            <a:r>
+              <a:rPr lang="en-AU" sz="3600" dirty="0"/>
+              <a:t>and D3</a:t>
+            </a:r>
+          </a:p>
+          <a:p>
+            <a:r>
               <a:rPr lang="en-AU" sz="3600" dirty="0"/>
               <a:t>Flask – app.py</a:t>
-            </a:r>
-          </a:p>
-          <a:p>
-            <a:r>
-              <a:rPr lang="en-AU" sz="3600" dirty="0" err="1"/>
-              <a:t>Javascript</a:t>
-            </a:r>
-            <a:r>
-              <a:rPr lang="en-AU" sz="3600" dirty="0"/>
-              <a:t>, </a:t>
-            </a:r>
-            <a:r>
-              <a:rPr lang="en-AU" sz="3600" dirty="0" err="1"/>
-              <a:t>Jqerry</a:t>
-            </a:r>
-            <a:r>
-              <a:rPr lang="en-AU" sz="3600" dirty="0"/>
-              <a:t> and D3</a:t>
             </a:r>
           </a:p>
           <a:p>
@@ -7119,7 +7228,7 @@
             </a:r>
             <a:r>
               <a:rPr lang="en-AU" sz="3600" dirty="0" err="1"/>
-              <a:t>jupyter</a:t>
+              <a:t>Jupyter</a:t>
             </a:r>
             <a:r>
               <a:rPr lang="en-AU" sz="3600" dirty="0"/>
@@ -7134,7 +7243,7 @@
             </a:pPr>
             <a:r>
               <a:rPr lang="en-AU" sz="3600" dirty="0"/>
-              <a:t>Save/load Models with </a:t>
+              <a:t>Save/load Models - </a:t>
             </a:r>
             <a:r>
               <a:rPr lang="en-AU" sz="3600" dirty="0" err="1"/>
@@ -7163,7 +7272,14 @@
   <p:clrMapOvr>
     <a:masterClrMapping/>
   </p:clrMapOvr>
-  <p:transition spd="slow"/>
+  <mc:AlternateContent xmlns:mc="http://schemas.openxmlformats.org/markup-compatibility/2006">
+    <mc:Choice xmlns:p14="http://schemas.microsoft.com/office/powerpoint/2010/main" Requires="p14">
+      <p:transition p14:dur="10"/>
+    </mc:Choice>
+    <mc:Fallback>
+      <p:transition/>
+    </mc:Fallback>
+  </mc:AlternateContent>
 </p:sld>
 </file>
 
@@ -7970,7 +8086,7 @@
   </p:clrMapOvr>
   <mc:AlternateContent xmlns:mc="http://schemas.openxmlformats.org/markup-compatibility/2006">
     <mc:Choice xmlns:p14="http://schemas.microsoft.com/office/powerpoint/2010/main" Requires="p14">
-      <p:transition p14:dur="250"/>
+      <p:transition p14:dur="10"/>
     </mc:Choice>
     <mc:Fallback>
       <p:transition/>
@@ -8047,19 +8163,13 @@
           <a:p>
             <a:r>
               <a:rPr lang="en-AU" sz="4000" dirty="0"/>
-              <a:t>Add more companies to Website</a:t>
+              <a:t>Add other companies to Website</a:t>
             </a:r>
           </a:p>
           <a:p>
             <a:r>
               <a:rPr lang="en-AU" sz="4000" dirty="0"/>
               <a:t>Additional visualisations and graphs</a:t>
-            </a:r>
-          </a:p>
-          <a:p>
-            <a:r>
-              <a:rPr lang="en-AU" sz="4000" dirty="0"/>
-              <a:t> Scrape data</a:t>
             </a:r>
           </a:p>
           <a:p>
@@ -8092,6 +8202,14 @@
   <p:clrMapOvr>
     <a:masterClrMapping/>
   </p:clrMapOvr>
+  <mc:AlternateContent xmlns:mc="http://schemas.openxmlformats.org/markup-compatibility/2006">
+    <mc:Choice xmlns:p14="http://schemas.microsoft.com/office/powerpoint/2010/main" Requires="p14">
+      <p:transition p14:dur="10"/>
+    </mc:Choice>
+    <mc:Fallback>
+      <p:transition/>
+    </mc:Fallback>
+  </mc:AlternateContent>
 </p:sld>
 </file>
 

</xml_diff>